<commit_message>
update nailgun defense slides.
</commit_message>
<xml_diff>
--- a/defense-lab/NailgunDefense.pptx
+++ b/defense-lab/NailgunDefense.pptx
@@ -2,7 +2,7 @@
 <file path=ppt/presentation.xml><?xml version="1.0" encoding="utf-8"?>
 <p:presentation xmlns:a="http://schemas.openxmlformats.org/drawingml/2006/main" xmlns:r="http://schemas.openxmlformats.org/officeDocument/2006/relationships" xmlns:p="http://schemas.openxmlformats.org/presentationml/2006/main" saveSubsetFonts="1">
   <p:sldMasterIdLst>
-    <p:sldMasterId id="2147483648" r:id="rId1"/>
+    <p:sldMasterId id="2147483710" r:id="rId1"/>
   </p:sldMasterIdLst>
   <p:sldIdLst>
     <p:sldId id="256" r:id="rId2"/>
@@ -45,9 +45,9 @@
   <p:notesSz cx="6858000" cy="9144000"/>
   <p:defaultTextStyle>
     <a:defPPr>
-      <a:defRPr lang="zh-CN"/>
+      <a:defRPr lang="en-US"/>
     </a:defPPr>
-    <a:lvl1pPr marL="0" algn="l" defTabSz="914400" rtl="0" eaLnBrk="1" latinLnBrk="0" hangingPunct="1">
+    <a:lvl1pPr marL="0" algn="l" defTabSz="457200" rtl="0" eaLnBrk="1" latinLnBrk="0" hangingPunct="1">
       <a:defRPr sz="1800" kern="1200">
         <a:solidFill>
           <a:schemeClr val="tx1"/>
@@ -57,7 +57,7 @@
         <a:cs typeface="+mn-cs"/>
       </a:defRPr>
     </a:lvl1pPr>
-    <a:lvl2pPr marL="457200" algn="l" defTabSz="914400" rtl="0" eaLnBrk="1" latinLnBrk="0" hangingPunct="1">
+    <a:lvl2pPr marL="457200" algn="l" defTabSz="457200" rtl="0" eaLnBrk="1" latinLnBrk="0" hangingPunct="1">
       <a:defRPr sz="1800" kern="1200">
         <a:solidFill>
           <a:schemeClr val="tx1"/>
@@ -67,7 +67,7 @@
         <a:cs typeface="+mn-cs"/>
       </a:defRPr>
     </a:lvl2pPr>
-    <a:lvl3pPr marL="914400" algn="l" defTabSz="914400" rtl="0" eaLnBrk="1" latinLnBrk="0" hangingPunct="1">
+    <a:lvl3pPr marL="914400" algn="l" defTabSz="457200" rtl="0" eaLnBrk="1" latinLnBrk="0" hangingPunct="1">
       <a:defRPr sz="1800" kern="1200">
         <a:solidFill>
           <a:schemeClr val="tx1"/>
@@ -77,7 +77,7 @@
         <a:cs typeface="+mn-cs"/>
       </a:defRPr>
     </a:lvl3pPr>
-    <a:lvl4pPr marL="1371600" algn="l" defTabSz="914400" rtl="0" eaLnBrk="1" latinLnBrk="0" hangingPunct="1">
+    <a:lvl4pPr marL="1371600" algn="l" defTabSz="457200" rtl="0" eaLnBrk="1" latinLnBrk="0" hangingPunct="1">
       <a:defRPr sz="1800" kern="1200">
         <a:solidFill>
           <a:schemeClr val="tx1"/>
@@ -87,7 +87,7 @@
         <a:cs typeface="+mn-cs"/>
       </a:defRPr>
     </a:lvl4pPr>
-    <a:lvl5pPr marL="1828800" algn="l" defTabSz="914400" rtl="0" eaLnBrk="1" latinLnBrk="0" hangingPunct="1">
+    <a:lvl5pPr marL="1828800" algn="l" defTabSz="457200" rtl="0" eaLnBrk="1" latinLnBrk="0" hangingPunct="1">
       <a:defRPr sz="1800" kern="1200">
         <a:solidFill>
           <a:schemeClr val="tx1"/>
@@ -97,7 +97,7 @@
         <a:cs typeface="+mn-cs"/>
       </a:defRPr>
     </a:lvl5pPr>
-    <a:lvl6pPr marL="2286000" algn="l" defTabSz="914400" rtl="0" eaLnBrk="1" latinLnBrk="0" hangingPunct="1">
+    <a:lvl6pPr marL="2286000" algn="l" defTabSz="457200" rtl="0" eaLnBrk="1" latinLnBrk="0" hangingPunct="1">
       <a:defRPr sz="1800" kern="1200">
         <a:solidFill>
           <a:schemeClr val="tx1"/>
@@ -107,7 +107,7 @@
         <a:cs typeface="+mn-cs"/>
       </a:defRPr>
     </a:lvl6pPr>
-    <a:lvl7pPr marL="2743200" algn="l" defTabSz="914400" rtl="0" eaLnBrk="1" latinLnBrk="0" hangingPunct="1">
+    <a:lvl7pPr marL="2743200" algn="l" defTabSz="457200" rtl="0" eaLnBrk="1" latinLnBrk="0" hangingPunct="1">
       <a:defRPr sz="1800" kern="1200">
         <a:solidFill>
           <a:schemeClr val="tx1"/>
@@ -117,7 +117,7 @@
         <a:cs typeface="+mn-cs"/>
       </a:defRPr>
     </a:lvl7pPr>
-    <a:lvl8pPr marL="3200400" algn="l" defTabSz="914400" rtl="0" eaLnBrk="1" latinLnBrk="0" hangingPunct="1">
+    <a:lvl8pPr marL="3200400" algn="l" defTabSz="457200" rtl="0" eaLnBrk="1" latinLnBrk="0" hangingPunct="1">
       <a:defRPr sz="1800" kern="1200">
         <a:solidFill>
           <a:schemeClr val="tx1"/>
@@ -127,7 +127,7 @@
         <a:cs typeface="+mn-cs"/>
       </a:defRPr>
     </a:lvl8pPr>
-    <a:lvl9pPr marL="3657600" algn="l" defTabSz="914400" rtl="0" eaLnBrk="1" latinLnBrk="0" hangingPunct="1">
+    <a:lvl9pPr marL="3657600" algn="l" defTabSz="457200" rtl="0" eaLnBrk="1" latinLnBrk="0" hangingPunct="1">
       <a:defRPr sz="1800" kern="1200">
         <a:solidFill>
           <a:schemeClr val="tx1"/>
@@ -148,7 +148,7 @@
 
 <file path=ppt/slideLayouts/slideLayout1.xml><?xml version="1.0" encoding="utf-8"?>
 <p:sldLayout xmlns:a="http://schemas.openxmlformats.org/drawingml/2006/main" xmlns:r="http://schemas.openxmlformats.org/officeDocument/2006/relationships" xmlns:p="http://schemas.openxmlformats.org/presentationml/2006/main" type="title" preserve="1">
-  <p:cSld name="标题幻灯片">
+  <p:cSld name="Title Slide">
     <p:spTree>
       <p:nvGrpSpPr>
         <p:cNvPr id="1" name=""/>
@@ -165,13 +165,7 @@
       </p:grpSpPr>
       <p:sp>
         <p:nvSpPr>
-          <p:cNvPr id="2" name="标题 1">
-            <a:extLst>
-              <a:ext uri="{FF2B5EF4-FFF2-40B4-BE49-F238E27FC236}">
-                <a16:creationId xmlns:a16="http://schemas.microsoft.com/office/drawing/2014/main" id="{33375D87-FB21-49A9-B3CB-671423103A8A}"/>
-              </a:ext>
-            </a:extLst>
-          </p:cNvPr>
+          <p:cNvPr id="2" name="Title 1"/>
           <p:cNvSpPr>
             <a:spLocks noGrp="1"/>
           </p:cNvSpPr>
@@ -181,8 +175,8 @@
         </p:nvSpPr>
         <p:spPr>
           <a:xfrm>
-            <a:off x="1524000" y="1122363"/>
-            <a:ext cx="9144000" cy="2387600"/>
+            <a:off x="914400" y="1122363"/>
+            <a:ext cx="10363200" cy="2387600"/>
           </a:xfrm>
         </p:spPr>
         <p:txBody>
@@ -194,21 +188,16 @@
           </a:lstStyle>
           <a:p>
             <a:r>
-              <a:rPr lang="zh-CN" altLang="en-US"/>
-              <a:t>单击此处编辑母版标题样式</a:t>
-            </a:r>
-          </a:p>
-        </p:txBody>
-      </p:sp>
-      <p:sp>
-        <p:nvSpPr>
-          <p:cNvPr id="3" name="副标题 2">
-            <a:extLst>
-              <a:ext uri="{FF2B5EF4-FFF2-40B4-BE49-F238E27FC236}">
-                <a16:creationId xmlns:a16="http://schemas.microsoft.com/office/drawing/2014/main" id="{A4B1436B-5B60-41C8-9655-CA7F4F998C8A}"/>
-              </a:ext>
-            </a:extLst>
-          </p:cNvPr>
+              <a:rPr lang="en-US"/>
+              <a:t>Click to edit Master title style</a:t>
+            </a:r>
+            <a:endParaRPr lang="en-US" dirty="0"/>
+          </a:p>
+        </p:txBody>
+      </p:sp>
+      <p:sp>
+        <p:nvSpPr>
+          <p:cNvPr id="3" name="Subtitle 2"/>
           <p:cNvSpPr>
             <a:spLocks noGrp="1"/>
           </p:cNvSpPr>
@@ -264,21 +253,16 @@
           </a:lstStyle>
           <a:p>
             <a:r>
-              <a:rPr lang="zh-CN" altLang="en-US"/>
-              <a:t>单击此处编辑母版副标题样式</a:t>
-            </a:r>
-          </a:p>
-        </p:txBody>
-      </p:sp>
-      <p:sp>
-        <p:nvSpPr>
-          <p:cNvPr id="4" name="日期占位符 3">
-            <a:extLst>
-              <a:ext uri="{FF2B5EF4-FFF2-40B4-BE49-F238E27FC236}">
-                <a16:creationId xmlns:a16="http://schemas.microsoft.com/office/drawing/2014/main" id="{34BF4B78-60E0-4F3E-97DD-48B0C1B90469}"/>
-              </a:ext>
-            </a:extLst>
-          </p:cNvPr>
+              <a:rPr lang="en-US"/>
+              <a:t>Click to edit Master subtitle style</a:t>
+            </a:r>
+            <a:endParaRPr lang="en-US" dirty="0"/>
+          </a:p>
+        </p:txBody>
+      </p:sp>
+      <p:sp>
+        <p:nvSpPr>
+          <p:cNvPr id="4" name="Date Placeholder 3"/>
           <p:cNvSpPr>
             <a:spLocks noGrp="1"/>
           </p:cNvSpPr>
@@ -293,7 +277,7 @@
           <a:p>
             <a:fld id="{5AE41CFA-8DA5-4173-9573-628222844F03}" type="datetimeFigureOut">
               <a:rPr lang="zh-CN" altLang="en-US" smtClean="0"/>
-              <a:t>2021/10/10</a:t>
+              <a:t>2021/10/30</a:t>
             </a:fld>
             <a:endParaRPr lang="zh-CN" altLang="en-US"/>
           </a:p>
@@ -301,13 +285,7 @@
       </p:sp>
       <p:sp>
         <p:nvSpPr>
-          <p:cNvPr id="5" name="页脚占位符 4">
-            <a:extLst>
-              <a:ext uri="{FF2B5EF4-FFF2-40B4-BE49-F238E27FC236}">
-                <a16:creationId xmlns:a16="http://schemas.microsoft.com/office/drawing/2014/main" id="{6C4D88CE-9E87-4AAB-9A1E-7CDA4730B58D}"/>
-              </a:ext>
-            </a:extLst>
-          </p:cNvPr>
+          <p:cNvPr id="5" name="Footer Placeholder 4"/>
           <p:cNvSpPr>
             <a:spLocks noGrp="1"/>
           </p:cNvSpPr>
@@ -326,13 +304,7 @@
       </p:sp>
       <p:sp>
         <p:nvSpPr>
-          <p:cNvPr id="6" name="灯片编号占位符 5">
-            <a:extLst>
-              <a:ext uri="{FF2B5EF4-FFF2-40B4-BE49-F238E27FC236}">
-                <a16:creationId xmlns:a16="http://schemas.microsoft.com/office/drawing/2014/main" id="{33CAC9C5-9E3A-453B-8777-A7EE88564CB2}"/>
-              </a:ext>
-            </a:extLst>
-          </p:cNvPr>
+          <p:cNvPr id="6" name="Slide Number Placeholder 5"/>
           <p:cNvSpPr>
             <a:spLocks noGrp="1"/>
           </p:cNvSpPr>
@@ -356,7 +328,7 @@
     </p:spTree>
     <p:extLst>
       <p:ext uri="{BB962C8B-B14F-4D97-AF65-F5344CB8AC3E}">
-        <p14:creationId xmlns:p14="http://schemas.microsoft.com/office/powerpoint/2010/main" val="3485335483"/>
+        <p14:creationId xmlns:p14="http://schemas.microsoft.com/office/powerpoint/2010/main" val="3523702442"/>
       </p:ext>
     </p:extLst>
   </p:cSld>
@@ -368,7 +340,7 @@
 
 <file path=ppt/slideLayouts/slideLayout10.xml><?xml version="1.0" encoding="utf-8"?>
 <p:sldLayout xmlns:a="http://schemas.openxmlformats.org/drawingml/2006/main" xmlns:r="http://schemas.openxmlformats.org/officeDocument/2006/relationships" xmlns:p="http://schemas.openxmlformats.org/presentationml/2006/main" type="vertTx" preserve="1">
-  <p:cSld name="标题和竖排文字">
+  <p:cSld name="Title and Vertical Text">
     <p:spTree>
       <p:nvGrpSpPr>
         <p:cNvPr id="1" name=""/>
@@ -385,13 +357,7 @@
       </p:grpSpPr>
       <p:sp>
         <p:nvSpPr>
-          <p:cNvPr id="2" name="标题 1">
-            <a:extLst>
-              <a:ext uri="{FF2B5EF4-FFF2-40B4-BE49-F238E27FC236}">
-                <a16:creationId xmlns:a16="http://schemas.microsoft.com/office/drawing/2014/main" id="{A0C11569-1A3F-470C-A24E-E9B82DA50793}"/>
-              </a:ext>
-            </a:extLst>
-          </p:cNvPr>
+          <p:cNvPr id="2" name="Title 1"/>
           <p:cNvSpPr>
             <a:spLocks noGrp="1"/>
           </p:cNvSpPr>
@@ -405,21 +371,16 @@
           <a:lstStyle/>
           <a:p>
             <a:r>
-              <a:rPr lang="zh-CN" altLang="en-US"/>
-              <a:t>单击此处编辑母版标题样式</a:t>
-            </a:r>
-          </a:p>
-        </p:txBody>
-      </p:sp>
-      <p:sp>
-        <p:nvSpPr>
-          <p:cNvPr id="3" name="竖排文字占位符 2">
-            <a:extLst>
-              <a:ext uri="{FF2B5EF4-FFF2-40B4-BE49-F238E27FC236}">
-                <a16:creationId xmlns:a16="http://schemas.microsoft.com/office/drawing/2014/main" id="{60BF44C7-BCDE-4808-B648-03CCC6D9CAD6}"/>
-              </a:ext>
-            </a:extLst>
-          </p:cNvPr>
+              <a:rPr lang="en-US"/>
+              <a:t>Click to edit Master title style</a:t>
+            </a:r>
+            <a:endParaRPr lang="en-US" dirty="0"/>
+          </a:p>
+        </p:txBody>
+      </p:sp>
+      <p:sp>
+        <p:nvSpPr>
+          <p:cNvPr id="3" name="Vertical Text Placeholder 2"/>
           <p:cNvSpPr>
             <a:spLocks noGrp="1"/>
           </p:cNvSpPr>
@@ -434,49 +395,44 @@
           <a:p>
             <a:pPr lvl="0"/>
             <a:r>
-              <a:rPr lang="zh-CN" altLang="en-US"/>
-              <a:t>单击此处编辑母版文本样式</a:t>
+              <a:rPr lang="en-US"/>
+              <a:t>Click to edit Master text styles</a:t>
             </a:r>
           </a:p>
           <a:p>
             <a:pPr lvl="1"/>
             <a:r>
-              <a:rPr lang="zh-CN" altLang="en-US"/>
-              <a:t>二级</a:t>
+              <a:rPr lang="en-US"/>
+              <a:t>Second level</a:t>
             </a:r>
           </a:p>
           <a:p>
             <a:pPr lvl="2"/>
             <a:r>
-              <a:rPr lang="zh-CN" altLang="en-US"/>
-              <a:t>三级</a:t>
+              <a:rPr lang="en-US"/>
+              <a:t>Third level</a:t>
             </a:r>
           </a:p>
           <a:p>
             <a:pPr lvl="3"/>
             <a:r>
-              <a:rPr lang="zh-CN" altLang="en-US"/>
-              <a:t>四级</a:t>
+              <a:rPr lang="en-US"/>
+              <a:t>Fourth level</a:t>
             </a:r>
           </a:p>
           <a:p>
             <a:pPr lvl="4"/>
             <a:r>
-              <a:rPr lang="zh-CN" altLang="en-US"/>
-              <a:t>五级</a:t>
-            </a:r>
-          </a:p>
-        </p:txBody>
-      </p:sp>
-      <p:sp>
-        <p:nvSpPr>
-          <p:cNvPr id="4" name="日期占位符 3">
-            <a:extLst>
-              <a:ext uri="{FF2B5EF4-FFF2-40B4-BE49-F238E27FC236}">
-                <a16:creationId xmlns:a16="http://schemas.microsoft.com/office/drawing/2014/main" id="{D3B9E514-98E7-4A1B-B734-64B7C4C6147E}"/>
-              </a:ext>
-            </a:extLst>
-          </p:cNvPr>
+              <a:rPr lang="en-US"/>
+              <a:t>Fifth level</a:t>
+            </a:r>
+            <a:endParaRPr lang="en-US" dirty="0"/>
+          </a:p>
+        </p:txBody>
+      </p:sp>
+      <p:sp>
+        <p:nvSpPr>
+          <p:cNvPr id="4" name="Date Placeholder 3"/>
           <p:cNvSpPr>
             <a:spLocks noGrp="1"/>
           </p:cNvSpPr>
@@ -491,7 +447,7 @@
           <a:p>
             <a:fld id="{5AE41CFA-8DA5-4173-9573-628222844F03}" type="datetimeFigureOut">
               <a:rPr lang="zh-CN" altLang="en-US" smtClean="0"/>
-              <a:t>2021/10/10</a:t>
+              <a:t>2021/10/30</a:t>
             </a:fld>
             <a:endParaRPr lang="zh-CN" altLang="en-US"/>
           </a:p>
@@ -499,13 +455,7 @@
       </p:sp>
       <p:sp>
         <p:nvSpPr>
-          <p:cNvPr id="5" name="页脚占位符 4">
-            <a:extLst>
-              <a:ext uri="{FF2B5EF4-FFF2-40B4-BE49-F238E27FC236}">
-                <a16:creationId xmlns:a16="http://schemas.microsoft.com/office/drawing/2014/main" id="{9217858D-F89A-416D-B76E-A40435F394D1}"/>
-              </a:ext>
-            </a:extLst>
-          </p:cNvPr>
+          <p:cNvPr id="5" name="Footer Placeholder 4"/>
           <p:cNvSpPr>
             <a:spLocks noGrp="1"/>
           </p:cNvSpPr>
@@ -524,13 +474,7 @@
       </p:sp>
       <p:sp>
         <p:nvSpPr>
-          <p:cNvPr id="6" name="灯片编号占位符 5">
-            <a:extLst>
-              <a:ext uri="{FF2B5EF4-FFF2-40B4-BE49-F238E27FC236}">
-                <a16:creationId xmlns:a16="http://schemas.microsoft.com/office/drawing/2014/main" id="{9395CD80-490A-4648-B62D-C95E4348139A}"/>
-              </a:ext>
-            </a:extLst>
-          </p:cNvPr>
+          <p:cNvPr id="6" name="Slide Number Placeholder 5"/>
           <p:cNvSpPr>
             <a:spLocks noGrp="1"/>
           </p:cNvSpPr>
@@ -554,7 +498,7 @@
     </p:spTree>
     <p:extLst>
       <p:ext uri="{BB962C8B-B14F-4D97-AF65-F5344CB8AC3E}">
-        <p14:creationId xmlns:p14="http://schemas.microsoft.com/office/powerpoint/2010/main" val="1579103721"/>
+        <p14:creationId xmlns:p14="http://schemas.microsoft.com/office/powerpoint/2010/main" val="711292019"/>
       </p:ext>
     </p:extLst>
   </p:cSld>
@@ -566,7 +510,7 @@
 
 <file path=ppt/slideLayouts/slideLayout11.xml><?xml version="1.0" encoding="utf-8"?>
 <p:sldLayout xmlns:a="http://schemas.openxmlformats.org/drawingml/2006/main" xmlns:r="http://schemas.openxmlformats.org/officeDocument/2006/relationships" xmlns:p="http://schemas.openxmlformats.org/presentationml/2006/main" type="vertTitleAndTx" preserve="1">
-  <p:cSld name="竖排标题与文本">
+  <p:cSld name="Vertical Title and Text">
     <p:spTree>
       <p:nvGrpSpPr>
         <p:cNvPr id="1" name=""/>
@@ -583,13 +527,7 @@
       </p:grpSpPr>
       <p:sp>
         <p:nvSpPr>
-          <p:cNvPr id="2" name="竖排标题 1">
-            <a:extLst>
-              <a:ext uri="{FF2B5EF4-FFF2-40B4-BE49-F238E27FC236}">
-                <a16:creationId xmlns:a16="http://schemas.microsoft.com/office/drawing/2014/main" id="{F4ADF32E-E0F4-4AB8-B251-EBE5FF83360F}"/>
-              </a:ext>
-            </a:extLst>
-          </p:cNvPr>
+          <p:cNvPr id="2" name="Vertical Title 1"/>
           <p:cNvSpPr>
             <a:spLocks noGrp="1"/>
           </p:cNvSpPr>
@@ -599,7 +537,7 @@
         </p:nvSpPr>
         <p:spPr>
           <a:xfrm>
-            <a:off x="8724900" y="365125"/>
+            <a:off x="8724901" y="365125"/>
             <a:ext cx="2628900" cy="5811838"/>
           </a:xfrm>
         </p:spPr>
@@ -608,21 +546,16 @@
           <a:lstStyle/>
           <a:p>
             <a:r>
-              <a:rPr lang="zh-CN" altLang="en-US"/>
-              <a:t>单击此处编辑母版标题样式</a:t>
-            </a:r>
-          </a:p>
-        </p:txBody>
-      </p:sp>
-      <p:sp>
-        <p:nvSpPr>
-          <p:cNvPr id="3" name="竖排文字占位符 2">
-            <a:extLst>
-              <a:ext uri="{FF2B5EF4-FFF2-40B4-BE49-F238E27FC236}">
-                <a16:creationId xmlns:a16="http://schemas.microsoft.com/office/drawing/2014/main" id="{B46558A7-362D-4C03-84CD-41898F5AC99B}"/>
-              </a:ext>
-            </a:extLst>
-          </p:cNvPr>
+              <a:rPr lang="en-US"/>
+              <a:t>Click to edit Master title style</a:t>
+            </a:r>
+            <a:endParaRPr lang="en-US" dirty="0"/>
+          </a:p>
+        </p:txBody>
+      </p:sp>
+      <p:sp>
+        <p:nvSpPr>
+          <p:cNvPr id="3" name="Vertical Text Placeholder 2"/>
           <p:cNvSpPr>
             <a:spLocks noGrp="1"/>
           </p:cNvSpPr>
@@ -632,7 +565,7 @@
         </p:nvSpPr>
         <p:spPr>
           <a:xfrm>
-            <a:off x="838200" y="365125"/>
+            <a:off x="838201" y="365125"/>
             <a:ext cx="7734300" cy="5811838"/>
           </a:xfrm>
         </p:spPr>
@@ -642,49 +575,44 @@
           <a:p>
             <a:pPr lvl="0"/>
             <a:r>
-              <a:rPr lang="zh-CN" altLang="en-US"/>
-              <a:t>单击此处编辑母版文本样式</a:t>
+              <a:rPr lang="en-US"/>
+              <a:t>Click to edit Master text styles</a:t>
             </a:r>
           </a:p>
           <a:p>
             <a:pPr lvl="1"/>
             <a:r>
-              <a:rPr lang="zh-CN" altLang="en-US"/>
-              <a:t>二级</a:t>
+              <a:rPr lang="en-US"/>
+              <a:t>Second level</a:t>
             </a:r>
           </a:p>
           <a:p>
             <a:pPr lvl="2"/>
             <a:r>
-              <a:rPr lang="zh-CN" altLang="en-US"/>
-              <a:t>三级</a:t>
+              <a:rPr lang="en-US"/>
+              <a:t>Third level</a:t>
             </a:r>
           </a:p>
           <a:p>
             <a:pPr lvl="3"/>
             <a:r>
-              <a:rPr lang="zh-CN" altLang="en-US"/>
-              <a:t>四级</a:t>
+              <a:rPr lang="en-US"/>
+              <a:t>Fourth level</a:t>
             </a:r>
           </a:p>
           <a:p>
             <a:pPr lvl="4"/>
             <a:r>
-              <a:rPr lang="zh-CN" altLang="en-US"/>
-              <a:t>五级</a:t>
-            </a:r>
-          </a:p>
-        </p:txBody>
-      </p:sp>
-      <p:sp>
-        <p:nvSpPr>
-          <p:cNvPr id="4" name="日期占位符 3">
-            <a:extLst>
-              <a:ext uri="{FF2B5EF4-FFF2-40B4-BE49-F238E27FC236}">
-                <a16:creationId xmlns:a16="http://schemas.microsoft.com/office/drawing/2014/main" id="{332346C5-7B08-469D-A807-AF05D48C930D}"/>
-              </a:ext>
-            </a:extLst>
-          </p:cNvPr>
+              <a:rPr lang="en-US"/>
+              <a:t>Fifth level</a:t>
+            </a:r>
+            <a:endParaRPr lang="en-US" dirty="0"/>
+          </a:p>
+        </p:txBody>
+      </p:sp>
+      <p:sp>
+        <p:nvSpPr>
+          <p:cNvPr id="4" name="Date Placeholder 3"/>
           <p:cNvSpPr>
             <a:spLocks noGrp="1"/>
           </p:cNvSpPr>
@@ -699,7 +627,7 @@
           <a:p>
             <a:fld id="{5AE41CFA-8DA5-4173-9573-628222844F03}" type="datetimeFigureOut">
               <a:rPr lang="zh-CN" altLang="en-US" smtClean="0"/>
-              <a:t>2021/10/10</a:t>
+              <a:t>2021/10/30</a:t>
             </a:fld>
             <a:endParaRPr lang="zh-CN" altLang="en-US"/>
           </a:p>
@@ -707,13 +635,7 @@
       </p:sp>
       <p:sp>
         <p:nvSpPr>
-          <p:cNvPr id="5" name="页脚占位符 4">
-            <a:extLst>
-              <a:ext uri="{FF2B5EF4-FFF2-40B4-BE49-F238E27FC236}">
-                <a16:creationId xmlns:a16="http://schemas.microsoft.com/office/drawing/2014/main" id="{20846667-B9B2-4A04-951F-46152C17A614}"/>
-              </a:ext>
-            </a:extLst>
-          </p:cNvPr>
+          <p:cNvPr id="5" name="Footer Placeholder 4"/>
           <p:cNvSpPr>
             <a:spLocks noGrp="1"/>
           </p:cNvSpPr>
@@ -732,13 +654,7 @@
       </p:sp>
       <p:sp>
         <p:nvSpPr>
-          <p:cNvPr id="6" name="灯片编号占位符 5">
-            <a:extLst>
-              <a:ext uri="{FF2B5EF4-FFF2-40B4-BE49-F238E27FC236}">
-                <a16:creationId xmlns:a16="http://schemas.microsoft.com/office/drawing/2014/main" id="{497092E7-BEE6-4F70-8575-6CB8AC9D0AB8}"/>
-              </a:ext>
-            </a:extLst>
-          </p:cNvPr>
+          <p:cNvPr id="6" name="Slide Number Placeholder 5"/>
           <p:cNvSpPr>
             <a:spLocks noGrp="1"/>
           </p:cNvSpPr>
@@ -762,7 +678,278 @@
     </p:spTree>
     <p:extLst>
       <p:ext uri="{BB962C8B-B14F-4D97-AF65-F5344CB8AC3E}">
-        <p14:creationId xmlns:p14="http://schemas.microsoft.com/office/powerpoint/2010/main" val="638076168"/>
+        <p14:creationId xmlns:p14="http://schemas.microsoft.com/office/powerpoint/2010/main" val="2254055427"/>
+      </p:ext>
+    </p:extLst>
+  </p:cSld>
+  <p:clrMapOvr>
+    <a:masterClrMapping/>
+  </p:clrMapOvr>
+</p:sldLayout>
+</file>
+
+<file path=ppt/slideLayouts/slideLayout12.xml><?xml version="1.0" encoding="utf-8"?>
+<p:sldLayout xmlns:a="http://schemas.openxmlformats.org/drawingml/2006/main" xmlns:r="http://schemas.openxmlformats.org/officeDocument/2006/relationships" xmlns:p="http://schemas.openxmlformats.org/presentationml/2006/main" type="tx">
+  <p:cSld name="Title and body">
+    <p:spTree>
+      <p:nvGrpSpPr>
+        <p:cNvPr id="1" name="Shape 16"/>
+        <p:cNvGrpSpPr/>
+        <p:nvPr/>
+      </p:nvGrpSpPr>
+      <p:grpSpPr>
+        <a:xfrm>
+          <a:off x="0" y="0"/>
+          <a:ext cx="0" cy="0"/>
+          <a:chOff x="0" y="0"/>
+          <a:chExt cx="0" cy="0"/>
+        </a:xfrm>
+      </p:grpSpPr>
+      <p:sp>
+        <p:nvSpPr>
+          <p:cNvPr id="17" name="Shape 17"/>
+          <p:cNvSpPr txBox="1">
+            <a:spLocks noGrp="1"/>
+          </p:cNvSpPr>
+          <p:nvPr>
+            <p:ph type="title"/>
+          </p:nvPr>
+        </p:nvSpPr>
+        <p:spPr>
+          <a:xfrm>
+            <a:off x="1490133" y="2567"/>
+            <a:ext cx="10286267" cy="763600"/>
+          </a:xfrm>
+          <a:prstGeom prst="rect">
+            <a:avLst/>
+          </a:prstGeom>
+        </p:spPr>
+        <p:txBody>
+          <a:bodyPr wrap="square" lIns="91425" tIns="91425" rIns="91425" bIns="91425" anchor="t" anchorCtr="0"/>
+          <a:lstStyle>
+            <a:lvl1pPr lvl="0">
+              <a:spcBef>
+                <a:spcPts val="0"/>
+              </a:spcBef>
+              <a:buSzPts val="2800"/>
+              <a:buNone/>
+              <a:defRPr/>
+            </a:lvl1pPr>
+            <a:lvl2pPr lvl="1">
+              <a:spcBef>
+                <a:spcPts val="0"/>
+              </a:spcBef>
+              <a:buSzPts val="2800"/>
+              <a:buNone/>
+              <a:defRPr/>
+            </a:lvl2pPr>
+            <a:lvl3pPr lvl="2">
+              <a:spcBef>
+                <a:spcPts val="0"/>
+              </a:spcBef>
+              <a:buSzPts val="2800"/>
+              <a:buNone/>
+              <a:defRPr/>
+            </a:lvl3pPr>
+            <a:lvl4pPr lvl="3">
+              <a:spcBef>
+                <a:spcPts val="0"/>
+              </a:spcBef>
+              <a:buSzPts val="2800"/>
+              <a:buNone/>
+              <a:defRPr/>
+            </a:lvl4pPr>
+            <a:lvl5pPr lvl="4">
+              <a:spcBef>
+                <a:spcPts val="0"/>
+              </a:spcBef>
+              <a:buSzPts val="2800"/>
+              <a:buNone/>
+              <a:defRPr/>
+            </a:lvl5pPr>
+            <a:lvl6pPr lvl="5">
+              <a:spcBef>
+                <a:spcPts val="0"/>
+              </a:spcBef>
+              <a:buSzPts val="2800"/>
+              <a:buNone/>
+              <a:defRPr/>
+            </a:lvl6pPr>
+            <a:lvl7pPr lvl="6">
+              <a:spcBef>
+                <a:spcPts val="0"/>
+              </a:spcBef>
+              <a:buSzPts val="2800"/>
+              <a:buNone/>
+              <a:defRPr/>
+            </a:lvl7pPr>
+            <a:lvl8pPr lvl="7">
+              <a:spcBef>
+                <a:spcPts val="0"/>
+              </a:spcBef>
+              <a:buSzPts val="2800"/>
+              <a:buNone/>
+              <a:defRPr/>
+            </a:lvl8pPr>
+            <a:lvl9pPr lvl="8">
+              <a:spcBef>
+                <a:spcPts val="0"/>
+              </a:spcBef>
+              <a:buSzPts val="2800"/>
+              <a:buNone/>
+              <a:defRPr/>
+            </a:lvl9pPr>
+          </a:lstStyle>
+          <a:p>
+            <a:r>
+              <a:rPr lang="en-US"/>
+              <a:t>Click to edit Master title style</a:t>
+            </a:r>
+            <a:endParaRPr dirty="0"/>
+          </a:p>
+        </p:txBody>
+      </p:sp>
+      <p:sp>
+        <p:nvSpPr>
+          <p:cNvPr id="18" name="Shape 18"/>
+          <p:cNvSpPr txBox="1">
+            <a:spLocks noGrp="1"/>
+          </p:cNvSpPr>
+          <p:nvPr>
+            <p:ph type="body" idx="1"/>
+          </p:nvPr>
+        </p:nvSpPr>
+        <p:spPr>
+          <a:xfrm>
+            <a:off x="415600" y="1062500"/>
+            <a:ext cx="11360800" cy="4555200"/>
+          </a:xfrm>
+          <a:prstGeom prst="rect">
+            <a:avLst/>
+          </a:prstGeom>
+        </p:spPr>
+        <p:txBody>
+          <a:bodyPr wrap="square" lIns="91425" tIns="91425" rIns="91425" bIns="91425" anchor="t" anchorCtr="0"/>
+          <a:lstStyle>
+            <a:lvl1pPr lvl="0">
+              <a:spcBef>
+                <a:spcPts val="0"/>
+              </a:spcBef>
+              <a:buSzPts val="1800"/>
+              <a:buChar char="●"/>
+              <a:defRPr/>
+            </a:lvl1pPr>
+            <a:lvl2pPr lvl="1">
+              <a:spcBef>
+                <a:spcPts val="0"/>
+              </a:spcBef>
+              <a:buSzPts val="1400"/>
+              <a:buChar char="○"/>
+              <a:defRPr/>
+            </a:lvl2pPr>
+            <a:lvl3pPr lvl="2">
+              <a:spcBef>
+                <a:spcPts val="0"/>
+              </a:spcBef>
+              <a:buSzPts val="1400"/>
+              <a:buChar char="■"/>
+              <a:defRPr/>
+            </a:lvl3pPr>
+            <a:lvl4pPr lvl="3">
+              <a:spcBef>
+                <a:spcPts val="0"/>
+              </a:spcBef>
+              <a:buSzPts val="1400"/>
+              <a:buChar char="●"/>
+              <a:defRPr/>
+            </a:lvl4pPr>
+            <a:lvl5pPr lvl="4">
+              <a:spcBef>
+                <a:spcPts val="0"/>
+              </a:spcBef>
+              <a:buSzPts val="1400"/>
+              <a:buChar char="○"/>
+              <a:defRPr/>
+            </a:lvl5pPr>
+            <a:lvl6pPr lvl="5">
+              <a:spcBef>
+                <a:spcPts val="0"/>
+              </a:spcBef>
+              <a:buSzPts val="1400"/>
+              <a:buChar char="■"/>
+              <a:defRPr/>
+            </a:lvl6pPr>
+            <a:lvl7pPr lvl="6">
+              <a:spcBef>
+                <a:spcPts val="0"/>
+              </a:spcBef>
+              <a:buSzPts val="1400"/>
+              <a:buChar char="●"/>
+              <a:defRPr/>
+            </a:lvl7pPr>
+            <a:lvl8pPr lvl="7">
+              <a:spcBef>
+                <a:spcPts val="0"/>
+              </a:spcBef>
+              <a:buSzPts val="1400"/>
+              <a:buChar char="○"/>
+              <a:defRPr/>
+            </a:lvl8pPr>
+            <a:lvl9pPr lvl="8">
+              <a:spcBef>
+                <a:spcPts val="0"/>
+              </a:spcBef>
+              <a:buSzPts val="1400"/>
+              <a:buChar char="■"/>
+              <a:defRPr/>
+            </a:lvl9pPr>
+          </a:lstStyle>
+          <a:p>
+            <a:pPr lvl="0"/>
+            <a:r>
+              <a:rPr lang="en-US"/>
+              <a:t>Click to edit Master text styles</a:t>
+            </a:r>
+          </a:p>
+        </p:txBody>
+      </p:sp>
+      <p:sp>
+        <p:nvSpPr>
+          <p:cNvPr id="19" name="Shape 19"/>
+          <p:cNvSpPr txBox="1">
+            <a:spLocks noGrp="1"/>
+          </p:cNvSpPr>
+          <p:nvPr>
+            <p:ph type="sldNum" idx="12"/>
+          </p:nvPr>
+        </p:nvSpPr>
+        <p:spPr>
+          <a:xfrm>
+            <a:off x="11296611" y="6217623"/>
+            <a:ext cx="731600" cy="524800"/>
+          </a:xfrm>
+          <a:prstGeom prst="rect">
+            <a:avLst/>
+          </a:prstGeom>
+        </p:spPr>
+        <p:txBody>
+          <a:bodyPr wrap="square" lIns="91425" tIns="91425" rIns="91425" bIns="91425" anchor="ctr" anchorCtr="0">
+            <a:noAutofit/>
+          </a:bodyPr>
+          <a:lstStyle/>
+          <a:p>
+            <a:fld id="{C659596A-905E-4569-BD45-E1BC5D31D3FE}" type="slidenum">
+              <a:rPr lang="zh-CN" altLang="en-US" smtClean="0"/>
+              <a:t>‹#›</a:t>
+            </a:fld>
+            <a:endParaRPr lang="zh-CN" altLang="en-US"/>
+          </a:p>
+        </p:txBody>
+      </p:sp>
+    </p:spTree>
+    <p:extLst>
+      <p:ext uri="{BB962C8B-B14F-4D97-AF65-F5344CB8AC3E}">
+        <p14:creationId xmlns:p14="http://schemas.microsoft.com/office/powerpoint/2010/main" val="1313585869"/>
       </p:ext>
     </p:extLst>
   </p:cSld>
@@ -774,7 +961,7 @@
 
 <file path=ppt/slideLayouts/slideLayout2.xml><?xml version="1.0" encoding="utf-8"?>
 <p:sldLayout xmlns:a="http://schemas.openxmlformats.org/drawingml/2006/main" xmlns:r="http://schemas.openxmlformats.org/officeDocument/2006/relationships" xmlns:p="http://schemas.openxmlformats.org/presentationml/2006/main" type="obj" preserve="1">
-  <p:cSld name="标题和内容">
+  <p:cSld name="Title and Content">
     <p:spTree>
       <p:nvGrpSpPr>
         <p:cNvPr id="1" name=""/>
@@ -791,13 +978,7 @@
       </p:grpSpPr>
       <p:sp>
         <p:nvSpPr>
-          <p:cNvPr id="2" name="标题 1">
-            <a:extLst>
-              <a:ext uri="{FF2B5EF4-FFF2-40B4-BE49-F238E27FC236}">
-                <a16:creationId xmlns:a16="http://schemas.microsoft.com/office/drawing/2014/main" id="{51C0E95B-8AF8-4E2E-8859-0447923EF8A4}"/>
-              </a:ext>
-            </a:extLst>
-          </p:cNvPr>
+          <p:cNvPr id="2" name="Title 1"/>
           <p:cNvSpPr>
             <a:spLocks noGrp="1"/>
           </p:cNvSpPr>
@@ -808,24 +989,26 @@
         <p:spPr/>
         <p:txBody>
           <a:bodyPr/>
-          <a:lstStyle/>
-          <a:p>
-            <a:r>
-              <a:rPr lang="zh-CN" altLang="en-US"/>
-              <a:t>单击此处编辑母版标题样式</a:t>
-            </a:r>
-          </a:p>
-        </p:txBody>
-      </p:sp>
-      <p:sp>
-        <p:nvSpPr>
-          <p:cNvPr id="3" name="内容占位符 2">
-            <a:extLst>
-              <a:ext uri="{FF2B5EF4-FFF2-40B4-BE49-F238E27FC236}">
-                <a16:creationId xmlns:a16="http://schemas.microsoft.com/office/drawing/2014/main" id="{15F68A86-AADD-434C-B1CC-4161A80E2F38}"/>
-              </a:ext>
-            </a:extLst>
-          </p:cNvPr>
+          <a:lstStyle>
+            <a:lvl1pPr>
+              <a:defRPr>
+                <a:latin typeface="Arial" panose="020B0604020202020204" pitchFamily="34" charset="0"/>
+                <a:cs typeface="Arial" panose="020B0604020202020204" pitchFamily="34" charset="0"/>
+              </a:defRPr>
+            </a:lvl1pPr>
+          </a:lstStyle>
+          <a:p>
+            <a:r>
+              <a:rPr lang="en-US"/>
+              <a:t>Click to edit Master title style</a:t>
+            </a:r>
+            <a:endParaRPr lang="en-US" dirty="0"/>
+          </a:p>
+        </p:txBody>
+      </p:sp>
+      <p:sp>
+        <p:nvSpPr>
+          <p:cNvPr id="3" name="Content Placeholder 2"/>
           <p:cNvSpPr>
             <a:spLocks noGrp="1"/>
           </p:cNvSpPr>
@@ -836,53 +1019,79 @@
         <p:spPr/>
         <p:txBody>
           <a:bodyPr/>
-          <a:lstStyle/>
+          <a:lstStyle>
+            <a:lvl1pPr>
+              <a:defRPr>
+                <a:latin typeface="Arial" panose="020B0604020202020204" pitchFamily="34" charset="0"/>
+                <a:cs typeface="Arial" panose="020B0604020202020204" pitchFamily="34" charset="0"/>
+              </a:defRPr>
+            </a:lvl1pPr>
+            <a:lvl2pPr>
+              <a:defRPr>
+                <a:latin typeface="Arial" panose="020B0604020202020204" pitchFamily="34" charset="0"/>
+                <a:cs typeface="Arial" panose="020B0604020202020204" pitchFamily="34" charset="0"/>
+              </a:defRPr>
+            </a:lvl2pPr>
+            <a:lvl3pPr>
+              <a:defRPr>
+                <a:latin typeface="Arial" panose="020B0604020202020204" pitchFamily="34" charset="0"/>
+                <a:cs typeface="Arial" panose="020B0604020202020204" pitchFamily="34" charset="0"/>
+              </a:defRPr>
+            </a:lvl3pPr>
+            <a:lvl4pPr>
+              <a:defRPr>
+                <a:latin typeface="Arial" panose="020B0604020202020204" pitchFamily="34" charset="0"/>
+                <a:cs typeface="Arial" panose="020B0604020202020204" pitchFamily="34" charset="0"/>
+              </a:defRPr>
+            </a:lvl4pPr>
+            <a:lvl5pPr>
+              <a:defRPr>
+                <a:latin typeface="Arial" panose="020B0604020202020204" pitchFamily="34" charset="0"/>
+                <a:cs typeface="Arial" panose="020B0604020202020204" pitchFamily="34" charset="0"/>
+              </a:defRPr>
+            </a:lvl5pPr>
+          </a:lstStyle>
           <a:p>
             <a:pPr lvl="0"/>
             <a:r>
-              <a:rPr lang="zh-CN" altLang="en-US"/>
-              <a:t>单击此处编辑母版文本样式</a:t>
+              <a:rPr lang="en-US"/>
+              <a:t>Click to edit Master text styles</a:t>
             </a:r>
           </a:p>
           <a:p>
             <a:pPr lvl="1"/>
             <a:r>
-              <a:rPr lang="zh-CN" altLang="en-US"/>
-              <a:t>二级</a:t>
+              <a:rPr lang="en-US"/>
+              <a:t>Second level</a:t>
             </a:r>
           </a:p>
           <a:p>
             <a:pPr lvl="2"/>
             <a:r>
-              <a:rPr lang="zh-CN" altLang="en-US"/>
-              <a:t>三级</a:t>
+              <a:rPr lang="en-US"/>
+              <a:t>Third level</a:t>
             </a:r>
           </a:p>
           <a:p>
             <a:pPr lvl="3"/>
             <a:r>
-              <a:rPr lang="zh-CN" altLang="en-US"/>
-              <a:t>四级</a:t>
+              <a:rPr lang="en-US"/>
+              <a:t>Fourth level</a:t>
             </a:r>
           </a:p>
           <a:p>
             <a:pPr lvl="4"/>
             <a:r>
-              <a:rPr lang="zh-CN" altLang="en-US"/>
-              <a:t>五级</a:t>
-            </a:r>
-          </a:p>
-        </p:txBody>
-      </p:sp>
-      <p:sp>
-        <p:nvSpPr>
-          <p:cNvPr id="4" name="日期占位符 3">
-            <a:extLst>
-              <a:ext uri="{FF2B5EF4-FFF2-40B4-BE49-F238E27FC236}">
-                <a16:creationId xmlns:a16="http://schemas.microsoft.com/office/drawing/2014/main" id="{0A9BCC89-C8D6-4FE3-AD67-594733E145DE}"/>
-              </a:ext>
-            </a:extLst>
-          </p:cNvPr>
+              <a:rPr lang="en-US"/>
+              <a:t>Fifth level</a:t>
+            </a:r>
+            <a:endParaRPr lang="en-US" dirty="0"/>
+          </a:p>
+        </p:txBody>
+      </p:sp>
+      <p:sp>
+        <p:nvSpPr>
+          <p:cNvPr id="4" name="Date Placeholder 3"/>
           <p:cNvSpPr>
             <a:spLocks noGrp="1"/>
           </p:cNvSpPr>
@@ -897,7 +1106,7 @@
           <a:p>
             <a:fld id="{5AE41CFA-8DA5-4173-9573-628222844F03}" type="datetimeFigureOut">
               <a:rPr lang="zh-CN" altLang="en-US" smtClean="0"/>
-              <a:t>2021/10/10</a:t>
+              <a:t>2021/10/30</a:t>
             </a:fld>
             <a:endParaRPr lang="zh-CN" altLang="en-US"/>
           </a:p>
@@ -905,13 +1114,7 @@
       </p:sp>
       <p:sp>
         <p:nvSpPr>
-          <p:cNvPr id="5" name="页脚占位符 4">
-            <a:extLst>
-              <a:ext uri="{FF2B5EF4-FFF2-40B4-BE49-F238E27FC236}">
-                <a16:creationId xmlns:a16="http://schemas.microsoft.com/office/drawing/2014/main" id="{1198A4D2-AE01-4E04-A777-300EFB9F74B1}"/>
-              </a:ext>
-            </a:extLst>
-          </p:cNvPr>
+          <p:cNvPr id="5" name="Footer Placeholder 4"/>
           <p:cNvSpPr>
             <a:spLocks noGrp="1"/>
           </p:cNvSpPr>
@@ -930,13 +1133,7 @@
       </p:sp>
       <p:sp>
         <p:nvSpPr>
-          <p:cNvPr id="6" name="灯片编号占位符 5">
-            <a:extLst>
-              <a:ext uri="{FF2B5EF4-FFF2-40B4-BE49-F238E27FC236}">
-                <a16:creationId xmlns:a16="http://schemas.microsoft.com/office/drawing/2014/main" id="{9777084F-6D8D-4590-B838-DF1295D37B2A}"/>
-              </a:ext>
-            </a:extLst>
-          </p:cNvPr>
+          <p:cNvPr id="6" name="Slide Number Placeholder 5"/>
           <p:cNvSpPr>
             <a:spLocks noGrp="1"/>
           </p:cNvSpPr>
@@ -960,7 +1157,7 @@
     </p:spTree>
     <p:extLst>
       <p:ext uri="{BB962C8B-B14F-4D97-AF65-F5344CB8AC3E}">
-        <p14:creationId xmlns:p14="http://schemas.microsoft.com/office/powerpoint/2010/main" val="1683688321"/>
+        <p14:creationId xmlns:p14="http://schemas.microsoft.com/office/powerpoint/2010/main" val="2190866399"/>
       </p:ext>
     </p:extLst>
   </p:cSld>
@@ -972,7 +1169,7 @@
 
 <file path=ppt/slideLayouts/slideLayout3.xml><?xml version="1.0" encoding="utf-8"?>
 <p:sldLayout xmlns:a="http://schemas.openxmlformats.org/drawingml/2006/main" xmlns:r="http://schemas.openxmlformats.org/officeDocument/2006/relationships" xmlns:p="http://schemas.openxmlformats.org/presentationml/2006/main" type="secHead" preserve="1">
-  <p:cSld name="节标题">
+  <p:cSld name="Section Header">
     <p:spTree>
       <p:nvGrpSpPr>
         <p:cNvPr id="1" name=""/>
@@ -989,13 +1186,7 @@
       </p:grpSpPr>
       <p:sp>
         <p:nvSpPr>
-          <p:cNvPr id="2" name="标题 1">
-            <a:extLst>
-              <a:ext uri="{FF2B5EF4-FFF2-40B4-BE49-F238E27FC236}">
-                <a16:creationId xmlns:a16="http://schemas.microsoft.com/office/drawing/2014/main" id="{BC92A76E-006D-4516-B761-98D509269FB7}"/>
-              </a:ext>
-            </a:extLst>
-          </p:cNvPr>
+          <p:cNvPr id="2" name="Title 1"/>
           <p:cNvSpPr>
             <a:spLocks noGrp="1"/>
           </p:cNvSpPr>
@@ -1005,7 +1196,7 @@
         </p:nvSpPr>
         <p:spPr>
           <a:xfrm>
-            <a:off x="831850" y="1709738"/>
+            <a:off x="831851" y="1709740"/>
             <a:ext cx="10515600" cy="2852737"/>
           </a:xfrm>
         </p:spPr>
@@ -1018,21 +1209,16 @@
           </a:lstStyle>
           <a:p>
             <a:r>
-              <a:rPr lang="zh-CN" altLang="en-US"/>
-              <a:t>单击此处编辑母版标题样式</a:t>
-            </a:r>
-          </a:p>
-        </p:txBody>
-      </p:sp>
-      <p:sp>
-        <p:nvSpPr>
-          <p:cNvPr id="3" name="文本占位符 2">
-            <a:extLst>
-              <a:ext uri="{FF2B5EF4-FFF2-40B4-BE49-F238E27FC236}">
-                <a16:creationId xmlns:a16="http://schemas.microsoft.com/office/drawing/2014/main" id="{56939BA0-B1B5-482E-9436-F234FE820108}"/>
-              </a:ext>
-            </a:extLst>
-          </p:cNvPr>
+              <a:rPr lang="en-US"/>
+              <a:t>Click to edit Master title style</a:t>
+            </a:r>
+            <a:endParaRPr lang="en-US" dirty="0"/>
+          </a:p>
+        </p:txBody>
+      </p:sp>
+      <p:sp>
+        <p:nvSpPr>
+          <p:cNvPr id="3" name="Text Placeholder 2"/>
           <p:cNvSpPr>
             <a:spLocks noGrp="1"/>
           </p:cNvSpPr>
@@ -1042,7 +1228,7 @@
         </p:nvSpPr>
         <p:spPr>
           <a:xfrm>
-            <a:off x="831850" y="4589463"/>
+            <a:off x="831851" y="4589465"/>
             <a:ext cx="10515600" cy="1500187"/>
           </a:xfrm>
         </p:spPr>
@@ -1053,9 +1239,7 @@
               <a:buNone/>
               <a:defRPr sz="2400">
                 <a:solidFill>
-                  <a:schemeClr val="tx1">
-                    <a:tint val="75000"/>
-                  </a:schemeClr>
+                  <a:schemeClr val="tx1"/>
                 </a:solidFill>
               </a:defRPr>
             </a:lvl1pPr>
@@ -1143,21 +1327,15 @@
           <a:p>
             <a:pPr lvl="0"/>
             <a:r>
-              <a:rPr lang="zh-CN" altLang="en-US"/>
-              <a:t>单击此处编辑母版文本样式</a:t>
-            </a:r>
-          </a:p>
-        </p:txBody>
-      </p:sp>
-      <p:sp>
-        <p:nvSpPr>
-          <p:cNvPr id="4" name="日期占位符 3">
-            <a:extLst>
-              <a:ext uri="{FF2B5EF4-FFF2-40B4-BE49-F238E27FC236}">
-                <a16:creationId xmlns:a16="http://schemas.microsoft.com/office/drawing/2014/main" id="{22B61695-A238-4A75-8090-56AA1FE793F5}"/>
-              </a:ext>
-            </a:extLst>
-          </p:cNvPr>
+              <a:rPr lang="en-US"/>
+              <a:t>Click to edit Master text styles</a:t>
+            </a:r>
+          </a:p>
+        </p:txBody>
+      </p:sp>
+      <p:sp>
+        <p:nvSpPr>
+          <p:cNvPr id="4" name="Date Placeholder 3"/>
           <p:cNvSpPr>
             <a:spLocks noGrp="1"/>
           </p:cNvSpPr>
@@ -1172,7 +1350,7 @@
           <a:p>
             <a:fld id="{5AE41CFA-8DA5-4173-9573-628222844F03}" type="datetimeFigureOut">
               <a:rPr lang="zh-CN" altLang="en-US" smtClean="0"/>
-              <a:t>2021/10/10</a:t>
+              <a:t>2021/10/30</a:t>
             </a:fld>
             <a:endParaRPr lang="zh-CN" altLang="en-US"/>
           </a:p>
@@ -1180,13 +1358,7 @@
       </p:sp>
       <p:sp>
         <p:nvSpPr>
-          <p:cNvPr id="5" name="页脚占位符 4">
-            <a:extLst>
-              <a:ext uri="{FF2B5EF4-FFF2-40B4-BE49-F238E27FC236}">
-                <a16:creationId xmlns:a16="http://schemas.microsoft.com/office/drawing/2014/main" id="{D8781B6B-F9DC-4C45-9925-7A4A1D155896}"/>
-              </a:ext>
-            </a:extLst>
-          </p:cNvPr>
+          <p:cNvPr id="5" name="Footer Placeholder 4"/>
           <p:cNvSpPr>
             <a:spLocks noGrp="1"/>
           </p:cNvSpPr>
@@ -1205,13 +1377,7 @@
       </p:sp>
       <p:sp>
         <p:nvSpPr>
-          <p:cNvPr id="6" name="灯片编号占位符 5">
-            <a:extLst>
-              <a:ext uri="{FF2B5EF4-FFF2-40B4-BE49-F238E27FC236}">
-                <a16:creationId xmlns:a16="http://schemas.microsoft.com/office/drawing/2014/main" id="{E3C88CBE-5311-4064-9B64-319C4A84E0BB}"/>
-              </a:ext>
-            </a:extLst>
-          </p:cNvPr>
+          <p:cNvPr id="6" name="Slide Number Placeholder 5"/>
           <p:cNvSpPr>
             <a:spLocks noGrp="1"/>
           </p:cNvSpPr>
@@ -1235,7 +1401,7 @@
     </p:spTree>
     <p:extLst>
       <p:ext uri="{BB962C8B-B14F-4D97-AF65-F5344CB8AC3E}">
-        <p14:creationId xmlns:p14="http://schemas.microsoft.com/office/powerpoint/2010/main" val="440999015"/>
+        <p14:creationId xmlns:p14="http://schemas.microsoft.com/office/powerpoint/2010/main" val="2929737003"/>
       </p:ext>
     </p:extLst>
   </p:cSld>
@@ -1247,7 +1413,7 @@
 
 <file path=ppt/slideLayouts/slideLayout4.xml><?xml version="1.0" encoding="utf-8"?>
 <p:sldLayout xmlns:a="http://schemas.openxmlformats.org/drawingml/2006/main" xmlns:r="http://schemas.openxmlformats.org/officeDocument/2006/relationships" xmlns:p="http://schemas.openxmlformats.org/presentationml/2006/main" type="twoObj" preserve="1">
-  <p:cSld name="两栏内容">
+  <p:cSld name="Two Content">
     <p:spTree>
       <p:nvGrpSpPr>
         <p:cNvPr id="1" name=""/>
@@ -1264,13 +1430,7 @@
       </p:grpSpPr>
       <p:sp>
         <p:nvSpPr>
-          <p:cNvPr id="2" name="标题 1">
-            <a:extLst>
-              <a:ext uri="{FF2B5EF4-FFF2-40B4-BE49-F238E27FC236}">
-                <a16:creationId xmlns:a16="http://schemas.microsoft.com/office/drawing/2014/main" id="{A96BC435-A7AD-498F-BB05-8CAF1A0AC94E}"/>
-              </a:ext>
-            </a:extLst>
-          </p:cNvPr>
+          <p:cNvPr id="2" name="Title 1"/>
           <p:cNvSpPr>
             <a:spLocks noGrp="1"/>
           </p:cNvSpPr>
@@ -1284,21 +1444,16 @@
           <a:lstStyle/>
           <a:p>
             <a:r>
-              <a:rPr lang="zh-CN" altLang="en-US"/>
-              <a:t>单击此处编辑母版标题样式</a:t>
-            </a:r>
-          </a:p>
-        </p:txBody>
-      </p:sp>
-      <p:sp>
-        <p:nvSpPr>
-          <p:cNvPr id="3" name="内容占位符 2">
-            <a:extLst>
-              <a:ext uri="{FF2B5EF4-FFF2-40B4-BE49-F238E27FC236}">
-                <a16:creationId xmlns:a16="http://schemas.microsoft.com/office/drawing/2014/main" id="{60528695-193F-466A-BE76-37D5B638BA84}"/>
-              </a:ext>
-            </a:extLst>
-          </p:cNvPr>
+              <a:rPr lang="en-US"/>
+              <a:t>Click to edit Master title style</a:t>
+            </a:r>
+            <a:endParaRPr lang="en-US" dirty="0"/>
+          </a:p>
+        </p:txBody>
+      </p:sp>
+      <p:sp>
+        <p:nvSpPr>
+          <p:cNvPr id="3" name="Content Placeholder 2"/>
           <p:cNvSpPr>
             <a:spLocks noGrp="1"/>
           </p:cNvSpPr>
@@ -1318,49 +1473,44 @@
           <a:p>
             <a:pPr lvl="0"/>
             <a:r>
-              <a:rPr lang="zh-CN" altLang="en-US"/>
-              <a:t>单击此处编辑母版文本样式</a:t>
+              <a:rPr lang="en-US"/>
+              <a:t>Click to edit Master text styles</a:t>
             </a:r>
           </a:p>
           <a:p>
             <a:pPr lvl="1"/>
             <a:r>
-              <a:rPr lang="zh-CN" altLang="en-US"/>
-              <a:t>二级</a:t>
+              <a:rPr lang="en-US"/>
+              <a:t>Second level</a:t>
             </a:r>
           </a:p>
           <a:p>
             <a:pPr lvl="2"/>
             <a:r>
-              <a:rPr lang="zh-CN" altLang="en-US"/>
-              <a:t>三级</a:t>
+              <a:rPr lang="en-US"/>
+              <a:t>Third level</a:t>
             </a:r>
           </a:p>
           <a:p>
             <a:pPr lvl="3"/>
             <a:r>
-              <a:rPr lang="zh-CN" altLang="en-US"/>
-              <a:t>四级</a:t>
+              <a:rPr lang="en-US"/>
+              <a:t>Fourth level</a:t>
             </a:r>
           </a:p>
           <a:p>
             <a:pPr lvl="4"/>
             <a:r>
-              <a:rPr lang="zh-CN" altLang="en-US"/>
-              <a:t>五级</a:t>
-            </a:r>
-          </a:p>
-        </p:txBody>
-      </p:sp>
-      <p:sp>
-        <p:nvSpPr>
-          <p:cNvPr id="4" name="内容占位符 3">
-            <a:extLst>
-              <a:ext uri="{FF2B5EF4-FFF2-40B4-BE49-F238E27FC236}">
-                <a16:creationId xmlns:a16="http://schemas.microsoft.com/office/drawing/2014/main" id="{FE66125E-5655-4943-9F74-4C8CE8D5CC2F}"/>
-              </a:ext>
-            </a:extLst>
-          </p:cNvPr>
+              <a:rPr lang="en-US"/>
+              <a:t>Fifth level</a:t>
+            </a:r>
+            <a:endParaRPr lang="en-US" dirty="0"/>
+          </a:p>
+        </p:txBody>
+      </p:sp>
+      <p:sp>
+        <p:nvSpPr>
+          <p:cNvPr id="4" name="Content Placeholder 3"/>
           <p:cNvSpPr>
             <a:spLocks noGrp="1"/>
           </p:cNvSpPr>
@@ -1380,49 +1530,44 @@
           <a:p>
             <a:pPr lvl="0"/>
             <a:r>
-              <a:rPr lang="zh-CN" altLang="en-US"/>
-              <a:t>单击此处编辑母版文本样式</a:t>
+              <a:rPr lang="en-US"/>
+              <a:t>Click to edit Master text styles</a:t>
             </a:r>
           </a:p>
           <a:p>
             <a:pPr lvl="1"/>
             <a:r>
-              <a:rPr lang="zh-CN" altLang="en-US"/>
-              <a:t>二级</a:t>
+              <a:rPr lang="en-US"/>
+              <a:t>Second level</a:t>
             </a:r>
           </a:p>
           <a:p>
             <a:pPr lvl="2"/>
             <a:r>
-              <a:rPr lang="zh-CN" altLang="en-US"/>
-              <a:t>三级</a:t>
+              <a:rPr lang="en-US"/>
+              <a:t>Third level</a:t>
             </a:r>
           </a:p>
           <a:p>
             <a:pPr lvl="3"/>
             <a:r>
-              <a:rPr lang="zh-CN" altLang="en-US"/>
-              <a:t>四级</a:t>
+              <a:rPr lang="en-US"/>
+              <a:t>Fourth level</a:t>
             </a:r>
           </a:p>
           <a:p>
             <a:pPr lvl="4"/>
             <a:r>
-              <a:rPr lang="zh-CN" altLang="en-US"/>
-              <a:t>五级</a:t>
-            </a:r>
-          </a:p>
-        </p:txBody>
-      </p:sp>
-      <p:sp>
-        <p:nvSpPr>
-          <p:cNvPr id="5" name="日期占位符 4">
-            <a:extLst>
-              <a:ext uri="{FF2B5EF4-FFF2-40B4-BE49-F238E27FC236}">
-                <a16:creationId xmlns:a16="http://schemas.microsoft.com/office/drawing/2014/main" id="{9BB9786A-FC2F-408E-8592-F621C33FC741}"/>
-              </a:ext>
-            </a:extLst>
-          </p:cNvPr>
+              <a:rPr lang="en-US"/>
+              <a:t>Fifth level</a:t>
+            </a:r>
+            <a:endParaRPr lang="en-US" dirty="0"/>
+          </a:p>
+        </p:txBody>
+      </p:sp>
+      <p:sp>
+        <p:nvSpPr>
+          <p:cNvPr id="5" name="Date Placeholder 4"/>
           <p:cNvSpPr>
             <a:spLocks noGrp="1"/>
           </p:cNvSpPr>
@@ -1437,7 +1582,7 @@
           <a:p>
             <a:fld id="{5AE41CFA-8DA5-4173-9573-628222844F03}" type="datetimeFigureOut">
               <a:rPr lang="zh-CN" altLang="en-US" smtClean="0"/>
-              <a:t>2021/10/10</a:t>
+              <a:t>2021/10/30</a:t>
             </a:fld>
             <a:endParaRPr lang="zh-CN" altLang="en-US"/>
           </a:p>
@@ -1445,13 +1590,7 @@
       </p:sp>
       <p:sp>
         <p:nvSpPr>
-          <p:cNvPr id="6" name="页脚占位符 5">
-            <a:extLst>
-              <a:ext uri="{FF2B5EF4-FFF2-40B4-BE49-F238E27FC236}">
-                <a16:creationId xmlns:a16="http://schemas.microsoft.com/office/drawing/2014/main" id="{C7F73364-3AB7-49FF-88D2-C7560979C17C}"/>
-              </a:ext>
-            </a:extLst>
-          </p:cNvPr>
+          <p:cNvPr id="6" name="Footer Placeholder 5"/>
           <p:cNvSpPr>
             <a:spLocks noGrp="1"/>
           </p:cNvSpPr>
@@ -1470,13 +1609,7 @@
       </p:sp>
       <p:sp>
         <p:nvSpPr>
-          <p:cNvPr id="7" name="灯片编号占位符 6">
-            <a:extLst>
-              <a:ext uri="{FF2B5EF4-FFF2-40B4-BE49-F238E27FC236}">
-                <a16:creationId xmlns:a16="http://schemas.microsoft.com/office/drawing/2014/main" id="{BA3D2A6C-6784-4604-BB30-CDFDE0152BED}"/>
-              </a:ext>
-            </a:extLst>
-          </p:cNvPr>
+          <p:cNvPr id="7" name="Slide Number Placeholder 6"/>
           <p:cNvSpPr>
             <a:spLocks noGrp="1"/>
           </p:cNvSpPr>
@@ -1500,7 +1633,7 @@
     </p:spTree>
     <p:extLst>
       <p:ext uri="{BB962C8B-B14F-4D97-AF65-F5344CB8AC3E}">
-        <p14:creationId xmlns:p14="http://schemas.microsoft.com/office/powerpoint/2010/main" val="3254456346"/>
+        <p14:creationId xmlns:p14="http://schemas.microsoft.com/office/powerpoint/2010/main" val="2088946324"/>
       </p:ext>
     </p:extLst>
   </p:cSld>
@@ -1512,7 +1645,7 @@
 
 <file path=ppt/slideLayouts/slideLayout5.xml><?xml version="1.0" encoding="utf-8"?>
 <p:sldLayout xmlns:a="http://schemas.openxmlformats.org/drawingml/2006/main" xmlns:r="http://schemas.openxmlformats.org/officeDocument/2006/relationships" xmlns:p="http://schemas.openxmlformats.org/presentationml/2006/main" type="twoTxTwoObj" preserve="1">
-  <p:cSld name="比较">
+  <p:cSld name="Comparison">
     <p:spTree>
       <p:nvGrpSpPr>
         <p:cNvPr id="1" name=""/>
@@ -1529,13 +1662,7 @@
       </p:grpSpPr>
       <p:sp>
         <p:nvSpPr>
-          <p:cNvPr id="2" name="标题 1">
-            <a:extLst>
-              <a:ext uri="{FF2B5EF4-FFF2-40B4-BE49-F238E27FC236}">
-                <a16:creationId xmlns:a16="http://schemas.microsoft.com/office/drawing/2014/main" id="{2E904A98-EDEC-4DD6-8463-4AC1BF8CDF2B}"/>
-              </a:ext>
-            </a:extLst>
-          </p:cNvPr>
+          <p:cNvPr id="2" name="Title 1"/>
           <p:cNvSpPr>
             <a:spLocks noGrp="1"/>
           </p:cNvSpPr>
@@ -1545,7 +1672,7 @@
         </p:nvSpPr>
         <p:spPr>
           <a:xfrm>
-            <a:off x="839788" y="365125"/>
+            <a:off x="839788" y="365127"/>
             <a:ext cx="10515600" cy="1325563"/>
           </a:xfrm>
         </p:spPr>
@@ -1554,21 +1681,16 @@
           <a:lstStyle/>
           <a:p>
             <a:r>
-              <a:rPr lang="zh-CN" altLang="en-US"/>
-              <a:t>单击此处编辑母版标题样式</a:t>
-            </a:r>
-          </a:p>
-        </p:txBody>
-      </p:sp>
-      <p:sp>
-        <p:nvSpPr>
-          <p:cNvPr id="3" name="文本占位符 2">
-            <a:extLst>
-              <a:ext uri="{FF2B5EF4-FFF2-40B4-BE49-F238E27FC236}">
-                <a16:creationId xmlns:a16="http://schemas.microsoft.com/office/drawing/2014/main" id="{A350E61A-6465-4A71-AD67-76CFCE39F301}"/>
-              </a:ext>
-            </a:extLst>
-          </p:cNvPr>
+              <a:rPr lang="en-US"/>
+              <a:t>Click to edit Master title style</a:t>
+            </a:r>
+            <a:endParaRPr lang="en-US" dirty="0"/>
+          </a:p>
+        </p:txBody>
+      </p:sp>
+      <p:sp>
+        <p:nvSpPr>
+          <p:cNvPr id="3" name="Text Placeholder 2"/>
           <p:cNvSpPr>
             <a:spLocks noGrp="1"/>
           </p:cNvSpPr>
@@ -1578,7 +1700,7 @@
         </p:nvSpPr>
         <p:spPr>
           <a:xfrm>
-            <a:off x="839788" y="1681163"/>
+            <a:off x="839789" y="1681163"/>
             <a:ext cx="5157787" cy="823912"/>
           </a:xfrm>
         </p:spPr>
@@ -1625,21 +1747,15 @@
           <a:p>
             <a:pPr lvl="0"/>
             <a:r>
-              <a:rPr lang="zh-CN" altLang="en-US"/>
-              <a:t>单击此处编辑母版文本样式</a:t>
-            </a:r>
-          </a:p>
-        </p:txBody>
-      </p:sp>
-      <p:sp>
-        <p:nvSpPr>
-          <p:cNvPr id="4" name="内容占位符 3">
-            <a:extLst>
-              <a:ext uri="{FF2B5EF4-FFF2-40B4-BE49-F238E27FC236}">
-                <a16:creationId xmlns:a16="http://schemas.microsoft.com/office/drawing/2014/main" id="{8D434155-4CE9-42FD-8167-9215195FFA80}"/>
-              </a:ext>
-            </a:extLst>
-          </p:cNvPr>
+              <a:rPr lang="en-US"/>
+              <a:t>Click to edit Master text styles</a:t>
+            </a:r>
+          </a:p>
+        </p:txBody>
+      </p:sp>
+      <p:sp>
+        <p:nvSpPr>
+          <p:cNvPr id="4" name="Content Placeholder 3"/>
           <p:cNvSpPr>
             <a:spLocks noGrp="1"/>
           </p:cNvSpPr>
@@ -1649,7 +1765,7 @@
         </p:nvSpPr>
         <p:spPr>
           <a:xfrm>
-            <a:off x="839788" y="2505075"/>
+            <a:off x="839789" y="2505075"/>
             <a:ext cx="5157787" cy="3684588"/>
           </a:xfrm>
         </p:spPr>
@@ -1659,49 +1775,44 @@
           <a:p>
             <a:pPr lvl="0"/>
             <a:r>
-              <a:rPr lang="zh-CN" altLang="en-US"/>
-              <a:t>单击此处编辑母版文本样式</a:t>
+              <a:rPr lang="en-US"/>
+              <a:t>Click to edit Master text styles</a:t>
             </a:r>
           </a:p>
           <a:p>
             <a:pPr lvl="1"/>
             <a:r>
-              <a:rPr lang="zh-CN" altLang="en-US"/>
-              <a:t>二级</a:t>
+              <a:rPr lang="en-US"/>
+              <a:t>Second level</a:t>
             </a:r>
           </a:p>
           <a:p>
             <a:pPr lvl="2"/>
             <a:r>
-              <a:rPr lang="zh-CN" altLang="en-US"/>
-              <a:t>三级</a:t>
+              <a:rPr lang="en-US"/>
+              <a:t>Third level</a:t>
             </a:r>
           </a:p>
           <a:p>
             <a:pPr lvl="3"/>
             <a:r>
-              <a:rPr lang="zh-CN" altLang="en-US"/>
-              <a:t>四级</a:t>
+              <a:rPr lang="en-US"/>
+              <a:t>Fourth level</a:t>
             </a:r>
           </a:p>
           <a:p>
             <a:pPr lvl="4"/>
             <a:r>
-              <a:rPr lang="zh-CN" altLang="en-US"/>
-              <a:t>五级</a:t>
-            </a:r>
-          </a:p>
-        </p:txBody>
-      </p:sp>
-      <p:sp>
-        <p:nvSpPr>
-          <p:cNvPr id="5" name="文本占位符 4">
-            <a:extLst>
-              <a:ext uri="{FF2B5EF4-FFF2-40B4-BE49-F238E27FC236}">
-                <a16:creationId xmlns:a16="http://schemas.microsoft.com/office/drawing/2014/main" id="{EFBDA3B7-0A15-4781-BA23-76B4787CCF00}"/>
-              </a:ext>
-            </a:extLst>
-          </p:cNvPr>
+              <a:rPr lang="en-US"/>
+              <a:t>Fifth level</a:t>
+            </a:r>
+            <a:endParaRPr lang="en-US" dirty="0"/>
+          </a:p>
+        </p:txBody>
+      </p:sp>
+      <p:sp>
+        <p:nvSpPr>
+          <p:cNvPr id="5" name="Text Placeholder 4"/>
           <p:cNvSpPr>
             <a:spLocks noGrp="1"/>
           </p:cNvSpPr>
@@ -1711,7 +1822,7 @@
         </p:nvSpPr>
         <p:spPr>
           <a:xfrm>
-            <a:off x="6172200" y="1681163"/>
+            <a:off x="6172201" y="1681163"/>
             <a:ext cx="5183188" cy="823912"/>
           </a:xfrm>
         </p:spPr>
@@ -1758,21 +1869,15 @@
           <a:p>
             <a:pPr lvl="0"/>
             <a:r>
-              <a:rPr lang="zh-CN" altLang="en-US"/>
-              <a:t>单击此处编辑母版文本样式</a:t>
-            </a:r>
-          </a:p>
-        </p:txBody>
-      </p:sp>
-      <p:sp>
-        <p:nvSpPr>
-          <p:cNvPr id="6" name="内容占位符 5">
-            <a:extLst>
-              <a:ext uri="{FF2B5EF4-FFF2-40B4-BE49-F238E27FC236}">
-                <a16:creationId xmlns:a16="http://schemas.microsoft.com/office/drawing/2014/main" id="{2E91B950-2277-4A51-B4D2-F4E401C460A3}"/>
-              </a:ext>
-            </a:extLst>
-          </p:cNvPr>
+              <a:rPr lang="en-US"/>
+              <a:t>Click to edit Master text styles</a:t>
+            </a:r>
+          </a:p>
+        </p:txBody>
+      </p:sp>
+      <p:sp>
+        <p:nvSpPr>
+          <p:cNvPr id="6" name="Content Placeholder 5"/>
           <p:cNvSpPr>
             <a:spLocks noGrp="1"/>
           </p:cNvSpPr>
@@ -1782,7 +1887,7 @@
         </p:nvSpPr>
         <p:spPr>
           <a:xfrm>
-            <a:off x="6172200" y="2505075"/>
+            <a:off x="6172201" y="2505075"/>
             <a:ext cx="5183188" cy="3684588"/>
           </a:xfrm>
         </p:spPr>
@@ -1792,49 +1897,44 @@
           <a:p>
             <a:pPr lvl="0"/>
             <a:r>
-              <a:rPr lang="zh-CN" altLang="en-US"/>
-              <a:t>单击此处编辑母版文本样式</a:t>
+              <a:rPr lang="en-US"/>
+              <a:t>Click to edit Master text styles</a:t>
             </a:r>
           </a:p>
           <a:p>
             <a:pPr lvl="1"/>
             <a:r>
-              <a:rPr lang="zh-CN" altLang="en-US"/>
-              <a:t>二级</a:t>
+              <a:rPr lang="en-US"/>
+              <a:t>Second level</a:t>
             </a:r>
           </a:p>
           <a:p>
             <a:pPr lvl="2"/>
             <a:r>
-              <a:rPr lang="zh-CN" altLang="en-US"/>
-              <a:t>三级</a:t>
+              <a:rPr lang="en-US"/>
+              <a:t>Third level</a:t>
             </a:r>
           </a:p>
           <a:p>
             <a:pPr lvl="3"/>
             <a:r>
-              <a:rPr lang="zh-CN" altLang="en-US"/>
-              <a:t>四级</a:t>
+              <a:rPr lang="en-US"/>
+              <a:t>Fourth level</a:t>
             </a:r>
           </a:p>
           <a:p>
             <a:pPr lvl="4"/>
             <a:r>
-              <a:rPr lang="zh-CN" altLang="en-US"/>
-              <a:t>五级</a:t>
-            </a:r>
-          </a:p>
-        </p:txBody>
-      </p:sp>
-      <p:sp>
-        <p:nvSpPr>
-          <p:cNvPr id="7" name="日期占位符 6">
-            <a:extLst>
-              <a:ext uri="{FF2B5EF4-FFF2-40B4-BE49-F238E27FC236}">
-                <a16:creationId xmlns:a16="http://schemas.microsoft.com/office/drawing/2014/main" id="{0E040323-BB20-422F-A485-07A26ECCDB19}"/>
-              </a:ext>
-            </a:extLst>
-          </p:cNvPr>
+              <a:rPr lang="en-US"/>
+              <a:t>Fifth level</a:t>
+            </a:r>
+            <a:endParaRPr lang="en-US" dirty="0"/>
+          </a:p>
+        </p:txBody>
+      </p:sp>
+      <p:sp>
+        <p:nvSpPr>
+          <p:cNvPr id="7" name="Date Placeholder 6"/>
           <p:cNvSpPr>
             <a:spLocks noGrp="1"/>
           </p:cNvSpPr>
@@ -1849,7 +1949,7 @@
           <a:p>
             <a:fld id="{5AE41CFA-8DA5-4173-9573-628222844F03}" type="datetimeFigureOut">
               <a:rPr lang="zh-CN" altLang="en-US" smtClean="0"/>
-              <a:t>2021/10/10</a:t>
+              <a:t>2021/10/30</a:t>
             </a:fld>
             <a:endParaRPr lang="zh-CN" altLang="en-US"/>
           </a:p>
@@ -1857,13 +1957,7 @@
       </p:sp>
       <p:sp>
         <p:nvSpPr>
-          <p:cNvPr id="8" name="页脚占位符 7">
-            <a:extLst>
-              <a:ext uri="{FF2B5EF4-FFF2-40B4-BE49-F238E27FC236}">
-                <a16:creationId xmlns:a16="http://schemas.microsoft.com/office/drawing/2014/main" id="{F28942A6-76F6-46D2-A9E7-DFEC5C72C877}"/>
-              </a:ext>
-            </a:extLst>
-          </p:cNvPr>
+          <p:cNvPr id="8" name="Footer Placeholder 7"/>
           <p:cNvSpPr>
             <a:spLocks noGrp="1"/>
           </p:cNvSpPr>
@@ -1882,13 +1976,7 @@
       </p:sp>
       <p:sp>
         <p:nvSpPr>
-          <p:cNvPr id="9" name="灯片编号占位符 8">
-            <a:extLst>
-              <a:ext uri="{FF2B5EF4-FFF2-40B4-BE49-F238E27FC236}">
-                <a16:creationId xmlns:a16="http://schemas.microsoft.com/office/drawing/2014/main" id="{E27EA20D-920A-4D07-B0BA-07D964A956C3}"/>
-              </a:ext>
-            </a:extLst>
-          </p:cNvPr>
+          <p:cNvPr id="9" name="Slide Number Placeholder 8"/>
           <p:cNvSpPr>
             <a:spLocks noGrp="1"/>
           </p:cNvSpPr>
@@ -1912,7 +2000,7 @@
     </p:spTree>
     <p:extLst>
       <p:ext uri="{BB962C8B-B14F-4D97-AF65-F5344CB8AC3E}">
-        <p14:creationId xmlns:p14="http://schemas.microsoft.com/office/powerpoint/2010/main" val="4132826222"/>
+        <p14:creationId xmlns:p14="http://schemas.microsoft.com/office/powerpoint/2010/main" val="3829411316"/>
       </p:ext>
     </p:extLst>
   </p:cSld>
@@ -1924,7 +2012,7 @@
 
 <file path=ppt/slideLayouts/slideLayout6.xml><?xml version="1.0" encoding="utf-8"?>
 <p:sldLayout xmlns:a="http://schemas.openxmlformats.org/drawingml/2006/main" xmlns:r="http://schemas.openxmlformats.org/officeDocument/2006/relationships" xmlns:p="http://schemas.openxmlformats.org/presentationml/2006/main" type="titleOnly" preserve="1">
-  <p:cSld name="仅标题">
+  <p:cSld name="Title Only">
     <p:spTree>
       <p:nvGrpSpPr>
         <p:cNvPr id="1" name=""/>
@@ -1941,13 +2029,7 @@
       </p:grpSpPr>
       <p:sp>
         <p:nvSpPr>
-          <p:cNvPr id="2" name="标题 1">
-            <a:extLst>
-              <a:ext uri="{FF2B5EF4-FFF2-40B4-BE49-F238E27FC236}">
-                <a16:creationId xmlns:a16="http://schemas.microsoft.com/office/drawing/2014/main" id="{25A9F5B6-6C82-44CE-8371-8A23A0BF0929}"/>
-              </a:ext>
-            </a:extLst>
-          </p:cNvPr>
+          <p:cNvPr id="2" name="Title 1"/>
           <p:cNvSpPr>
             <a:spLocks noGrp="1"/>
           </p:cNvSpPr>
@@ -1961,21 +2043,16 @@
           <a:lstStyle/>
           <a:p>
             <a:r>
-              <a:rPr lang="zh-CN" altLang="en-US"/>
-              <a:t>单击此处编辑母版标题样式</a:t>
-            </a:r>
-          </a:p>
-        </p:txBody>
-      </p:sp>
-      <p:sp>
-        <p:nvSpPr>
-          <p:cNvPr id="3" name="日期占位符 2">
-            <a:extLst>
-              <a:ext uri="{FF2B5EF4-FFF2-40B4-BE49-F238E27FC236}">
-                <a16:creationId xmlns:a16="http://schemas.microsoft.com/office/drawing/2014/main" id="{D21EB9ED-8A4E-40DC-96DA-2AA03AB6A8EF}"/>
-              </a:ext>
-            </a:extLst>
-          </p:cNvPr>
+              <a:rPr lang="en-US"/>
+              <a:t>Click to edit Master title style</a:t>
+            </a:r>
+            <a:endParaRPr lang="en-US" dirty="0"/>
+          </a:p>
+        </p:txBody>
+      </p:sp>
+      <p:sp>
+        <p:nvSpPr>
+          <p:cNvPr id="3" name="Date Placeholder 2"/>
           <p:cNvSpPr>
             <a:spLocks noGrp="1"/>
           </p:cNvSpPr>
@@ -1990,7 +2067,7 @@
           <a:p>
             <a:fld id="{5AE41CFA-8DA5-4173-9573-628222844F03}" type="datetimeFigureOut">
               <a:rPr lang="zh-CN" altLang="en-US" smtClean="0"/>
-              <a:t>2021/10/10</a:t>
+              <a:t>2021/10/30</a:t>
             </a:fld>
             <a:endParaRPr lang="zh-CN" altLang="en-US"/>
           </a:p>
@@ -1998,13 +2075,7 @@
       </p:sp>
       <p:sp>
         <p:nvSpPr>
-          <p:cNvPr id="4" name="页脚占位符 3">
-            <a:extLst>
-              <a:ext uri="{FF2B5EF4-FFF2-40B4-BE49-F238E27FC236}">
-                <a16:creationId xmlns:a16="http://schemas.microsoft.com/office/drawing/2014/main" id="{75E2A5C0-F664-411B-99DA-86F816970A23}"/>
-              </a:ext>
-            </a:extLst>
-          </p:cNvPr>
+          <p:cNvPr id="4" name="Footer Placeholder 3"/>
           <p:cNvSpPr>
             <a:spLocks noGrp="1"/>
           </p:cNvSpPr>
@@ -2023,13 +2094,7 @@
       </p:sp>
       <p:sp>
         <p:nvSpPr>
-          <p:cNvPr id="5" name="灯片编号占位符 4">
-            <a:extLst>
-              <a:ext uri="{FF2B5EF4-FFF2-40B4-BE49-F238E27FC236}">
-                <a16:creationId xmlns:a16="http://schemas.microsoft.com/office/drawing/2014/main" id="{866574BF-E192-4915-B174-49F5D36557C0}"/>
-              </a:ext>
-            </a:extLst>
-          </p:cNvPr>
+          <p:cNvPr id="5" name="Slide Number Placeholder 4"/>
           <p:cNvSpPr>
             <a:spLocks noGrp="1"/>
           </p:cNvSpPr>
@@ -2053,7 +2118,7 @@
     </p:spTree>
     <p:extLst>
       <p:ext uri="{BB962C8B-B14F-4D97-AF65-F5344CB8AC3E}">
-        <p14:creationId xmlns:p14="http://schemas.microsoft.com/office/powerpoint/2010/main" val="3800573126"/>
+        <p14:creationId xmlns:p14="http://schemas.microsoft.com/office/powerpoint/2010/main" val="521092276"/>
       </p:ext>
     </p:extLst>
   </p:cSld>
@@ -2065,7 +2130,7 @@
 
 <file path=ppt/slideLayouts/slideLayout7.xml><?xml version="1.0" encoding="utf-8"?>
 <p:sldLayout xmlns:a="http://schemas.openxmlformats.org/drawingml/2006/main" xmlns:r="http://schemas.openxmlformats.org/officeDocument/2006/relationships" xmlns:p="http://schemas.openxmlformats.org/presentationml/2006/main" type="blank" preserve="1">
-  <p:cSld name="空白">
+  <p:cSld name="Blank">
     <p:spTree>
       <p:nvGrpSpPr>
         <p:cNvPr id="1" name=""/>
@@ -2082,13 +2147,7 @@
       </p:grpSpPr>
       <p:sp>
         <p:nvSpPr>
-          <p:cNvPr id="2" name="日期占位符 1">
-            <a:extLst>
-              <a:ext uri="{FF2B5EF4-FFF2-40B4-BE49-F238E27FC236}">
-                <a16:creationId xmlns:a16="http://schemas.microsoft.com/office/drawing/2014/main" id="{1B677C9B-77DD-4134-85D5-1255651EB738}"/>
-              </a:ext>
-            </a:extLst>
-          </p:cNvPr>
+          <p:cNvPr id="2" name="Date Placeholder 1"/>
           <p:cNvSpPr>
             <a:spLocks noGrp="1"/>
           </p:cNvSpPr>
@@ -2103,7 +2162,7 @@
           <a:p>
             <a:fld id="{5AE41CFA-8DA5-4173-9573-628222844F03}" type="datetimeFigureOut">
               <a:rPr lang="zh-CN" altLang="en-US" smtClean="0"/>
-              <a:t>2021/10/10</a:t>
+              <a:t>2021/10/30</a:t>
             </a:fld>
             <a:endParaRPr lang="zh-CN" altLang="en-US"/>
           </a:p>
@@ -2111,13 +2170,7 @@
       </p:sp>
       <p:sp>
         <p:nvSpPr>
-          <p:cNvPr id="3" name="页脚占位符 2">
-            <a:extLst>
-              <a:ext uri="{FF2B5EF4-FFF2-40B4-BE49-F238E27FC236}">
-                <a16:creationId xmlns:a16="http://schemas.microsoft.com/office/drawing/2014/main" id="{811A56C6-3619-4B56-963B-7C519ADB73BE}"/>
-              </a:ext>
-            </a:extLst>
-          </p:cNvPr>
+          <p:cNvPr id="3" name="Footer Placeholder 2"/>
           <p:cNvSpPr>
             <a:spLocks noGrp="1"/>
           </p:cNvSpPr>
@@ -2136,13 +2189,7 @@
       </p:sp>
       <p:sp>
         <p:nvSpPr>
-          <p:cNvPr id="4" name="灯片编号占位符 3">
-            <a:extLst>
-              <a:ext uri="{FF2B5EF4-FFF2-40B4-BE49-F238E27FC236}">
-                <a16:creationId xmlns:a16="http://schemas.microsoft.com/office/drawing/2014/main" id="{E2738A54-3879-43B3-B19A-D992BF3E2FB5}"/>
-              </a:ext>
-            </a:extLst>
-          </p:cNvPr>
+          <p:cNvPr id="4" name="Slide Number Placeholder 3"/>
           <p:cNvSpPr>
             <a:spLocks noGrp="1"/>
           </p:cNvSpPr>
@@ -2166,7 +2213,7 @@
     </p:spTree>
     <p:extLst>
       <p:ext uri="{BB962C8B-B14F-4D97-AF65-F5344CB8AC3E}">
-        <p14:creationId xmlns:p14="http://schemas.microsoft.com/office/powerpoint/2010/main" val="3179083066"/>
+        <p14:creationId xmlns:p14="http://schemas.microsoft.com/office/powerpoint/2010/main" val="261013007"/>
       </p:ext>
     </p:extLst>
   </p:cSld>
@@ -2178,7 +2225,7 @@
 
 <file path=ppt/slideLayouts/slideLayout8.xml><?xml version="1.0" encoding="utf-8"?>
 <p:sldLayout xmlns:a="http://schemas.openxmlformats.org/drawingml/2006/main" xmlns:r="http://schemas.openxmlformats.org/officeDocument/2006/relationships" xmlns:p="http://schemas.openxmlformats.org/presentationml/2006/main" type="objTx" preserve="1">
-  <p:cSld name="内容与标题">
+  <p:cSld name="Content with Caption">
     <p:spTree>
       <p:nvGrpSpPr>
         <p:cNvPr id="1" name=""/>
@@ -2195,13 +2242,7 @@
       </p:grpSpPr>
       <p:sp>
         <p:nvSpPr>
-          <p:cNvPr id="2" name="标题 1">
-            <a:extLst>
-              <a:ext uri="{FF2B5EF4-FFF2-40B4-BE49-F238E27FC236}">
-                <a16:creationId xmlns:a16="http://schemas.microsoft.com/office/drawing/2014/main" id="{14F0EAC1-9206-436B-90C3-87C35D8D09B0}"/>
-              </a:ext>
-            </a:extLst>
-          </p:cNvPr>
+          <p:cNvPr id="2" name="Title 1"/>
           <p:cNvSpPr>
             <a:spLocks noGrp="1"/>
           </p:cNvSpPr>
@@ -2224,21 +2265,16 @@
           </a:lstStyle>
           <a:p>
             <a:r>
-              <a:rPr lang="zh-CN" altLang="en-US"/>
-              <a:t>单击此处编辑母版标题样式</a:t>
-            </a:r>
-          </a:p>
-        </p:txBody>
-      </p:sp>
-      <p:sp>
-        <p:nvSpPr>
-          <p:cNvPr id="3" name="内容占位符 2">
-            <a:extLst>
-              <a:ext uri="{FF2B5EF4-FFF2-40B4-BE49-F238E27FC236}">
-                <a16:creationId xmlns:a16="http://schemas.microsoft.com/office/drawing/2014/main" id="{D03C73E8-4A65-4465-9986-B499B4299519}"/>
-              </a:ext>
-            </a:extLst>
-          </p:cNvPr>
+              <a:rPr lang="en-US"/>
+              <a:t>Click to edit Master title style</a:t>
+            </a:r>
+            <a:endParaRPr lang="en-US" dirty="0"/>
+          </a:p>
+        </p:txBody>
+      </p:sp>
+      <p:sp>
+        <p:nvSpPr>
+          <p:cNvPr id="3" name="Content Placeholder 2"/>
           <p:cNvSpPr>
             <a:spLocks noGrp="1"/>
           </p:cNvSpPr>
@@ -2248,7 +2284,7 @@
         </p:nvSpPr>
         <p:spPr>
           <a:xfrm>
-            <a:off x="5183188" y="987425"/>
+            <a:off x="5183188" y="987427"/>
             <a:ext cx="6172200" cy="4873625"/>
           </a:xfrm>
         </p:spPr>
@@ -2286,49 +2322,44 @@
           <a:p>
             <a:pPr lvl="0"/>
             <a:r>
-              <a:rPr lang="zh-CN" altLang="en-US"/>
-              <a:t>单击此处编辑母版文本样式</a:t>
+              <a:rPr lang="en-US"/>
+              <a:t>Click to edit Master text styles</a:t>
             </a:r>
           </a:p>
           <a:p>
             <a:pPr lvl="1"/>
             <a:r>
-              <a:rPr lang="zh-CN" altLang="en-US"/>
-              <a:t>二级</a:t>
+              <a:rPr lang="en-US"/>
+              <a:t>Second level</a:t>
             </a:r>
           </a:p>
           <a:p>
             <a:pPr lvl="2"/>
             <a:r>
-              <a:rPr lang="zh-CN" altLang="en-US"/>
-              <a:t>三级</a:t>
+              <a:rPr lang="en-US"/>
+              <a:t>Third level</a:t>
             </a:r>
           </a:p>
           <a:p>
             <a:pPr lvl="3"/>
             <a:r>
-              <a:rPr lang="zh-CN" altLang="en-US"/>
-              <a:t>四级</a:t>
+              <a:rPr lang="en-US"/>
+              <a:t>Fourth level</a:t>
             </a:r>
           </a:p>
           <a:p>
             <a:pPr lvl="4"/>
             <a:r>
-              <a:rPr lang="zh-CN" altLang="en-US"/>
-              <a:t>五级</a:t>
-            </a:r>
-          </a:p>
-        </p:txBody>
-      </p:sp>
-      <p:sp>
-        <p:nvSpPr>
-          <p:cNvPr id="4" name="文本占位符 3">
-            <a:extLst>
-              <a:ext uri="{FF2B5EF4-FFF2-40B4-BE49-F238E27FC236}">
-                <a16:creationId xmlns:a16="http://schemas.microsoft.com/office/drawing/2014/main" id="{D4538394-2233-4D66-BB15-2A1CBCC2B68D}"/>
-              </a:ext>
-            </a:extLst>
-          </p:cNvPr>
+              <a:rPr lang="en-US"/>
+              <a:t>Fifth level</a:t>
+            </a:r>
+            <a:endParaRPr lang="en-US" dirty="0"/>
+          </a:p>
+        </p:txBody>
+      </p:sp>
+      <p:sp>
+        <p:nvSpPr>
+          <p:cNvPr id="4" name="Text Placeholder 3"/>
           <p:cNvSpPr>
             <a:spLocks noGrp="1"/>
           </p:cNvSpPr>
@@ -2385,21 +2416,15 @@
           <a:p>
             <a:pPr lvl="0"/>
             <a:r>
-              <a:rPr lang="zh-CN" altLang="en-US"/>
-              <a:t>单击此处编辑母版文本样式</a:t>
-            </a:r>
-          </a:p>
-        </p:txBody>
-      </p:sp>
-      <p:sp>
-        <p:nvSpPr>
-          <p:cNvPr id="5" name="日期占位符 4">
-            <a:extLst>
-              <a:ext uri="{FF2B5EF4-FFF2-40B4-BE49-F238E27FC236}">
-                <a16:creationId xmlns:a16="http://schemas.microsoft.com/office/drawing/2014/main" id="{A33930E4-5720-4923-9867-9226061296F9}"/>
-              </a:ext>
-            </a:extLst>
-          </p:cNvPr>
+              <a:rPr lang="en-US"/>
+              <a:t>Click to edit Master text styles</a:t>
+            </a:r>
+          </a:p>
+        </p:txBody>
+      </p:sp>
+      <p:sp>
+        <p:nvSpPr>
+          <p:cNvPr id="5" name="Date Placeholder 4"/>
           <p:cNvSpPr>
             <a:spLocks noGrp="1"/>
           </p:cNvSpPr>
@@ -2414,7 +2439,7 @@
           <a:p>
             <a:fld id="{5AE41CFA-8DA5-4173-9573-628222844F03}" type="datetimeFigureOut">
               <a:rPr lang="zh-CN" altLang="en-US" smtClean="0"/>
-              <a:t>2021/10/10</a:t>
+              <a:t>2021/10/30</a:t>
             </a:fld>
             <a:endParaRPr lang="zh-CN" altLang="en-US"/>
           </a:p>
@@ -2422,13 +2447,7 @@
       </p:sp>
       <p:sp>
         <p:nvSpPr>
-          <p:cNvPr id="6" name="页脚占位符 5">
-            <a:extLst>
-              <a:ext uri="{FF2B5EF4-FFF2-40B4-BE49-F238E27FC236}">
-                <a16:creationId xmlns:a16="http://schemas.microsoft.com/office/drawing/2014/main" id="{64AFA0DB-ADA1-4813-8E42-E22FE9BCE0A3}"/>
-              </a:ext>
-            </a:extLst>
-          </p:cNvPr>
+          <p:cNvPr id="6" name="Footer Placeholder 5"/>
           <p:cNvSpPr>
             <a:spLocks noGrp="1"/>
           </p:cNvSpPr>
@@ -2447,13 +2466,7 @@
       </p:sp>
       <p:sp>
         <p:nvSpPr>
-          <p:cNvPr id="7" name="灯片编号占位符 6">
-            <a:extLst>
-              <a:ext uri="{FF2B5EF4-FFF2-40B4-BE49-F238E27FC236}">
-                <a16:creationId xmlns:a16="http://schemas.microsoft.com/office/drawing/2014/main" id="{EB46D5ED-BE49-443B-AD25-48ADF2798D4A}"/>
-              </a:ext>
-            </a:extLst>
-          </p:cNvPr>
+          <p:cNvPr id="7" name="Slide Number Placeholder 6"/>
           <p:cNvSpPr>
             <a:spLocks noGrp="1"/>
           </p:cNvSpPr>
@@ -2477,7 +2490,7 @@
     </p:spTree>
     <p:extLst>
       <p:ext uri="{BB962C8B-B14F-4D97-AF65-F5344CB8AC3E}">
-        <p14:creationId xmlns:p14="http://schemas.microsoft.com/office/powerpoint/2010/main" val="1658909593"/>
+        <p14:creationId xmlns:p14="http://schemas.microsoft.com/office/powerpoint/2010/main" val="233842484"/>
       </p:ext>
     </p:extLst>
   </p:cSld>
@@ -2489,7 +2502,7 @@
 
 <file path=ppt/slideLayouts/slideLayout9.xml><?xml version="1.0" encoding="utf-8"?>
 <p:sldLayout xmlns:a="http://schemas.openxmlformats.org/drawingml/2006/main" xmlns:r="http://schemas.openxmlformats.org/officeDocument/2006/relationships" xmlns:p="http://schemas.openxmlformats.org/presentationml/2006/main" type="picTx" preserve="1">
-  <p:cSld name="图片与标题">
+  <p:cSld name="Picture with Caption">
     <p:spTree>
       <p:nvGrpSpPr>
         <p:cNvPr id="1" name=""/>
@@ -2506,13 +2519,7 @@
       </p:grpSpPr>
       <p:sp>
         <p:nvSpPr>
-          <p:cNvPr id="2" name="标题 1">
-            <a:extLst>
-              <a:ext uri="{FF2B5EF4-FFF2-40B4-BE49-F238E27FC236}">
-                <a16:creationId xmlns:a16="http://schemas.microsoft.com/office/drawing/2014/main" id="{CB72A8C3-A96A-435A-9BAC-CDC631254CEE}"/>
-              </a:ext>
-            </a:extLst>
-          </p:cNvPr>
+          <p:cNvPr id="2" name="Title 1"/>
           <p:cNvSpPr>
             <a:spLocks noGrp="1"/>
           </p:cNvSpPr>
@@ -2535,23 +2542,18 @@
           </a:lstStyle>
           <a:p>
             <a:r>
-              <a:rPr lang="zh-CN" altLang="en-US"/>
-              <a:t>单击此处编辑母版标题样式</a:t>
-            </a:r>
-          </a:p>
-        </p:txBody>
-      </p:sp>
-      <p:sp>
-        <p:nvSpPr>
-          <p:cNvPr id="3" name="图片占位符 2">
-            <a:extLst>
-              <a:ext uri="{FF2B5EF4-FFF2-40B4-BE49-F238E27FC236}">
-                <a16:creationId xmlns:a16="http://schemas.microsoft.com/office/drawing/2014/main" id="{0C1584E9-641E-4C32-8240-9D248BCD7CD6}"/>
-              </a:ext>
-            </a:extLst>
-          </p:cNvPr>
-          <p:cNvSpPr>
-            <a:spLocks noGrp="1"/>
+              <a:rPr lang="en-US"/>
+              <a:t>Click to edit Master title style</a:t>
+            </a:r>
+            <a:endParaRPr lang="en-US" dirty="0"/>
+          </a:p>
+        </p:txBody>
+      </p:sp>
+      <p:sp>
+        <p:nvSpPr>
+          <p:cNvPr id="3" name="Picture Placeholder 2"/>
+          <p:cNvSpPr>
+            <a:spLocks noGrp="1" noChangeAspect="1"/>
           </p:cNvSpPr>
           <p:nvPr>
             <p:ph type="pic" idx="1"/>
@@ -2559,8 +2561,73 @@
         </p:nvSpPr>
         <p:spPr>
           <a:xfrm>
-            <a:off x="5183188" y="987425"/>
+            <a:off x="5183188" y="987427"/>
             <a:ext cx="6172200" cy="4873625"/>
+          </a:xfrm>
+        </p:spPr>
+        <p:txBody>
+          <a:bodyPr anchor="t"/>
+          <a:lstStyle>
+            <a:lvl1pPr marL="0" indent="0">
+              <a:buNone/>
+              <a:defRPr sz="3200"/>
+            </a:lvl1pPr>
+            <a:lvl2pPr marL="457200" indent="0">
+              <a:buNone/>
+              <a:defRPr sz="2800"/>
+            </a:lvl2pPr>
+            <a:lvl3pPr marL="914400" indent="0">
+              <a:buNone/>
+              <a:defRPr sz="2400"/>
+            </a:lvl3pPr>
+            <a:lvl4pPr marL="1371600" indent="0">
+              <a:buNone/>
+              <a:defRPr sz="2000"/>
+            </a:lvl4pPr>
+            <a:lvl5pPr marL="1828800" indent="0">
+              <a:buNone/>
+              <a:defRPr sz="2000"/>
+            </a:lvl5pPr>
+            <a:lvl6pPr marL="2286000" indent="0">
+              <a:buNone/>
+              <a:defRPr sz="2000"/>
+            </a:lvl6pPr>
+            <a:lvl7pPr marL="2743200" indent="0">
+              <a:buNone/>
+              <a:defRPr sz="2000"/>
+            </a:lvl7pPr>
+            <a:lvl8pPr marL="3200400" indent="0">
+              <a:buNone/>
+              <a:defRPr sz="2000"/>
+            </a:lvl8pPr>
+            <a:lvl9pPr marL="3657600" indent="0">
+              <a:buNone/>
+              <a:defRPr sz="2000"/>
+            </a:lvl9pPr>
+          </a:lstStyle>
+          <a:p>
+            <a:r>
+              <a:rPr lang="en-US"/>
+              <a:t>Click icon to add picture</a:t>
+            </a:r>
+            <a:endParaRPr lang="en-US" dirty="0"/>
+          </a:p>
+        </p:txBody>
+      </p:sp>
+      <p:sp>
+        <p:nvSpPr>
+          <p:cNvPr id="4" name="Text Placeholder 3"/>
+          <p:cNvSpPr>
+            <a:spLocks noGrp="1"/>
+          </p:cNvSpPr>
+          <p:nvPr>
+            <p:ph type="body" sz="half" idx="2"/>
+          </p:nvPr>
+        </p:nvSpPr>
+        <p:spPr>
+          <a:xfrm>
+            <a:off x="839788" y="2057400"/>
+            <a:ext cx="3932237" cy="3811588"/>
           </a:xfrm>
         </p:spPr>
         <p:txBody>
@@ -2568,73 +2635,6 @@
           <a:lstStyle>
             <a:lvl1pPr marL="0" indent="0">
               <a:buNone/>
-              <a:defRPr sz="3200"/>
-            </a:lvl1pPr>
-            <a:lvl2pPr marL="457200" indent="0">
-              <a:buNone/>
-              <a:defRPr sz="2800"/>
-            </a:lvl2pPr>
-            <a:lvl3pPr marL="914400" indent="0">
-              <a:buNone/>
-              <a:defRPr sz="2400"/>
-            </a:lvl3pPr>
-            <a:lvl4pPr marL="1371600" indent="0">
-              <a:buNone/>
-              <a:defRPr sz="2000"/>
-            </a:lvl4pPr>
-            <a:lvl5pPr marL="1828800" indent="0">
-              <a:buNone/>
-              <a:defRPr sz="2000"/>
-            </a:lvl5pPr>
-            <a:lvl6pPr marL="2286000" indent="0">
-              <a:buNone/>
-              <a:defRPr sz="2000"/>
-            </a:lvl6pPr>
-            <a:lvl7pPr marL="2743200" indent="0">
-              <a:buNone/>
-              <a:defRPr sz="2000"/>
-            </a:lvl7pPr>
-            <a:lvl8pPr marL="3200400" indent="0">
-              <a:buNone/>
-              <a:defRPr sz="2000"/>
-            </a:lvl8pPr>
-            <a:lvl9pPr marL="3657600" indent="0">
-              <a:buNone/>
-              <a:defRPr sz="2000"/>
-            </a:lvl9pPr>
-          </a:lstStyle>
-          <a:p>
-            <a:endParaRPr lang="zh-CN" altLang="en-US"/>
-          </a:p>
-        </p:txBody>
-      </p:sp>
-      <p:sp>
-        <p:nvSpPr>
-          <p:cNvPr id="4" name="文本占位符 3">
-            <a:extLst>
-              <a:ext uri="{FF2B5EF4-FFF2-40B4-BE49-F238E27FC236}">
-                <a16:creationId xmlns:a16="http://schemas.microsoft.com/office/drawing/2014/main" id="{B584DC9C-4199-4D46-AF2F-1D06E46792F8}"/>
-              </a:ext>
-            </a:extLst>
-          </p:cNvPr>
-          <p:cNvSpPr>
-            <a:spLocks noGrp="1"/>
-          </p:cNvSpPr>
-          <p:nvPr>
-            <p:ph type="body" sz="half" idx="2"/>
-          </p:nvPr>
-        </p:nvSpPr>
-        <p:spPr>
-          <a:xfrm>
-            <a:off x="839788" y="2057400"/>
-            <a:ext cx="3932237" cy="3811588"/>
-          </a:xfrm>
-        </p:spPr>
-        <p:txBody>
-          <a:bodyPr/>
-          <a:lstStyle>
-            <a:lvl1pPr marL="0" indent="0">
-              <a:buNone/>
               <a:defRPr sz="1600"/>
             </a:lvl1pPr>
             <a:lvl2pPr marL="457200" indent="0">
@@ -2673,21 +2673,15 @@
           <a:p>
             <a:pPr lvl="0"/>
             <a:r>
-              <a:rPr lang="zh-CN" altLang="en-US"/>
-              <a:t>单击此处编辑母版文本样式</a:t>
-            </a:r>
-          </a:p>
-        </p:txBody>
-      </p:sp>
-      <p:sp>
-        <p:nvSpPr>
-          <p:cNvPr id="5" name="日期占位符 4">
-            <a:extLst>
-              <a:ext uri="{FF2B5EF4-FFF2-40B4-BE49-F238E27FC236}">
-                <a16:creationId xmlns:a16="http://schemas.microsoft.com/office/drawing/2014/main" id="{DB877CFC-7640-414B-9A6C-73E2197AE8D7}"/>
-              </a:ext>
-            </a:extLst>
-          </p:cNvPr>
+              <a:rPr lang="en-US"/>
+              <a:t>Click to edit Master text styles</a:t>
+            </a:r>
+          </a:p>
+        </p:txBody>
+      </p:sp>
+      <p:sp>
+        <p:nvSpPr>
+          <p:cNvPr id="5" name="Date Placeholder 4"/>
           <p:cNvSpPr>
             <a:spLocks noGrp="1"/>
           </p:cNvSpPr>
@@ -2702,7 +2696,7 @@
           <a:p>
             <a:fld id="{5AE41CFA-8DA5-4173-9573-628222844F03}" type="datetimeFigureOut">
               <a:rPr lang="zh-CN" altLang="en-US" smtClean="0"/>
-              <a:t>2021/10/10</a:t>
+              <a:t>2021/10/30</a:t>
             </a:fld>
             <a:endParaRPr lang="zh-CN" altLang="en-US"/>
           </a:p>
@@ -2710,13 +2704,7 @@
       </p:sp>
       <p:sp>
         <p:nvSpPr>
-          <p:cNvPr id="6" name="页脚占位符 5">
-            <a:extLst>
-              <a:ext uri="{FF2B5EF4-FFF2-40B4-BE49-F238E27FC236}">
-                <a16:creationId xmlns:a16="http://schemas.microsoft.com/office/drawing/2014/main" id="{4F4873E7-D25B-4D51-95BB-1131685B1C0B}"/>
-              </a:ext>
-            </a:extLst>
-          </p:cNvPr>
+          <p:cNvPr id="6" name="Footer Placeholder 5"/>
           <p:cNvSpPr>
             <a:spLocks noGrp="1"/>
           </p:cNvSpPr>
@@ -2735,13 +2723,7 @@
       </p:sp>
       <p:sp>
         <p:nvSpPr>
-          <p:cNvPr id="7" name="灯片编号占位符 6">
-            <a:extLst>
-              <a:ext uri="{FF2B5EF4-FFF2-40B4-BE49-F238E27FC236}">
-                <a16:creationId xmlns:a16="http://schemas.microsoft.com/office/drawing/2014/main" id="{F27628AB-2625-4A51-8DE8-9A83C2970385}"/>
-              </a:ext>
-            </a:extLst>
-          </p:cNvPr>
+          <p:cNvPr id="7" name="Slide Number Placeholder 6"/>
           <p:cNvSpPr>
             <a:spLocks noGrp="1"/>
           </p:cNvSpPr>
@@ -2765,7 +2747,7 @@
     </p:spTree>
     <p:extLst>
       <p:ext uri="{BB962C8B-B14F-4D97-AF65-F5344CB8AC3E}">
-        <p14:creationId xmlns:p14="http://schemas.microsoft.com/office/powerpoint/2010/main" val="2286416260"/>
+        <p14:creationId xmlns:p14="http://schemas.microsoft.com/office/powerpoint/2010/main" val="280188930"/>
       </p:ext>
     </p:extLst>
   </p:cSld>
@@ -2780,11 +2762,15 @@
   <p:cSld>
     <p:bg>
       <p:bgPr>
-        <a:solidFill>
-          <a:schemeClr val="bg1">
-            <a:lumMod val="75000"/>
-          </a:schemeClr>
-        </a:solidFill>
+        <a:blipFill dpi="0" rotWithShape="1">
+          <a:blip r:embed="rId14">
+            <a:lum/>
+          </a:blip>
+          <a:srcRect/>
+          <a:stretch>
+            <a:fillRect l="90000" b="87000"/>
+          </a:stretch>
+        </a:blipFill>
         <a:effectLst/>
       </p:bgPr>
     </p:bg>
@@ -2804,13 +2790,7 @@
       </p:grpSpPr>
       <p:sp>
         <p:nvSpPr>
-          <p:cNvPr id="2" name="标题占位符 1">
-            <a:extLst>
-              <a:ext uri="{FF2B5EF4-FFF2-40B4-BE49-F238E27FC236}">
-                <a16:creationId xmlns:a16="http://schemas.microsoft.com/office/drawing/2014/main" id="{F09E93E2-6F82-44C3-AE26-8BFB254E21FE}"/>
-              </a:ext>
-            </a:extLst>
-          </p:cNvPr>
+          <p:cNvPr id="2" name="Title Placeholder 1"/>
           <p:cNvSpPr>
             <a:spLocks noGrp="1"/>
           </p:cNvSpPr>
@@ -2820,7 +2800,7 @@
         </p:nvSpPr>
         <p:spPr>
           <a:xfrm>
-            <a:off x="838200" y="365125"/>
+            <a:off x="838200" y="365127"/>
             <a:ext cx="10515600" cy="1325563"/>
           </a:xfrm>
           <a:prstGeom prst="rect">
@@ -2834,21 +2814,16 @@
           <a:lstStyle/>
           <a:p>
             <a:r>
-              <a:rPr lang="zh-CN" altLang="en-US"/>
-              <a:t>单击此处编辑母版标题样式</a:t>
-            </a:r>
-          </a:p>
-        </p:txBody>
-      </p:sp>
-      <p:sp>
-        <p:nvSpPr>
-          <p:cNvPr id="3" name="文本占位符 2">
-            <a:extLst>
-              <a:ext uri="{FF2B5EF4-FFF2-40B4-BE49-F238E27FC236}">
-                <a16:creationId xmlns:a16="http://schemas.microsoft.com/office/drawing/2014/main" id="{20DAADF7-6557-475A-946B-68F2FA8EE9EB}"/>
-              </a:ext>
-            </a:extLst>
-          </p:cNvPr>
+              <a:rPr lang="en-US"/>
+              <a:t>Click to edit Master title style</a:t>
+            </a:r>
+            <a:endParaRPr lang="en-US" dirty="0"/>
+          </a:p>
+        </p:txBody>
+      </p:sp>
+      <p:sp>
+        <p:nvSpPr>
+          <p:cNvPr id="3" name="Text Placeholder 2"/>
           <p:cNvSpPr>
             <a:spLocks noGrp="1"/>
           </p:cNvSpPr>
@@ -2873,49 +2848,44 @@
           <a:p>
             <a:pPr lvl="0"/>
             <a:r>
-              <a:rPr lang="zh-CN" altLang="en-US"/>
-              <a:t>单击此处编辑母版文本样式</a:t>
+              <a:rPr lang="en-US"/>
+              <a:t>Click to edit Master text styles</a:t>
             </a:r>
           </a:p>
           <a:p>
             <a:pPr lvl="1"/>
             <a:r>
-              <a:rPr lang="zh-CN" altLang="en-US"/>
-              <a:t>二级</a:t>
+              <a:rPr lang="en-US"/>
+              <a:t>Second level</a:t>
             </a:r>
           </a:p>
           <a:p>
             <a:pPr lvl="2"/>
             <a:r>
-              <a:rPr lang="zh-CN" altLang="en-US"/>
-              <a:t>三级</a:t>
+              <a:rPr lang="en-US"/>
+              <a:t>Third level</a:t>
             </a:r>
           </a:p>
           <a:p>
             <a:pPr lvl="3"/>
             <a:r>
-              <a:rPr lang="zh-CN" altLang="en-US"/>
-              <a:t>四级</a:t>
+              <a:rPr lang="en-US"/>
+              <a:t>Fourth level</a:t>
             </a:r>
           </a:p>
           <a:p>
             <a:pPr lvl="4"/>
             <a:r>
-              <a:rPr lang="zh-CN" altLang="en-US"/>
-              <a:t>五级</a:t>
-            </a:r>
-          </a:p>
-        </p:txBody>
-      </p:sp>
-      <p:sp>
-        <p:nvSpPr>
-          <p:cNvPr id="4" name="日期占位符 3">
-            <a:extLst>
-              <a:ext uri="{FF2B5EF4-FFF2-40B4-BE49-F238E27FC236}">
-                <a16:creationId xmlns:a16="http://schemas.microsoft.com/office/drawing/2014/main" id="{888334E3-C435-4AA5-BE2E-8B58FE1E541E}"/>
-              </a:ext>
-            </a:extLst>
-          </p:cNvPr>
+              <a:rPr lang="en-US"/>
+              <a:t>Fifth level</a:t>
+            </a:r>
+            <a:endParaRPr lang="en-US" dirty="0"/>
+          </a:p>
+        </p:txBody>
+      </p:sp>
+      <p:sp>
+        <p:nvSpPr>
+          <p:cNvPr id="4" name="Date Placeholder 3"/>
           <p:cNvSpPr>
             <a:spLocks noGrp="1"/>
           </p:cNvSpPr>
@@ -2925,7 +2895,7 @@
         </p:nvSpPr>
         <p:spPr>
           <a:xfrm>
-            <a:off x="838200" y="6356350"/>
+            <a:off x="838200" y="6356352"/>
             <a:ext cx="2743200" cy="365125"/>
           </a:xfrm>
           <a:prstGeom prst="rect">
@@ -2948,7 +2918,7 @@
           <a:p>
             <a:fld id="{5AE41CFA-8DA5-4173-9573-628222844F03}" type="datetimeFigureOut">
               <a:rPr lang="zh-CN" altLang="en-US" smtClean="0"/>
-              <a:t>2021/10/10</a:t>
+              <a:t>2021/10/30</a:t>
             </a:fld>
             <a:endParaRPr lang="zh-CN" altLang="en-US"/>
           </a:p>
@@ -2956,13 +2926,7 @@
       </p:sp>
       <p:sp>
         <p:nvSpPr>
-          <p:cNvPr id="5" name="页脚占位符 4">
-            <a:extLst>
-              <a:ext uri="{FF2B5EF4-FFF2-40B4-BE49-F238E27FC236}">
-                <a16:creationId xmlns:a16="http://schemas.microsoft.com/office/drawing/2014/main" id="{E165A1D0-737C-45C4-BE79-1CB597C6A12C}"/>
-              </a:ext>
-            </a:extLst>
-          </p:cNvPr>
+          <p:cNvPr id="5" name="Footer Placeholder 4"/>
           <p:cNvSpPr>
             <a:spLocks noGrp="1"/>
           </p:cNvSpPr>
@@ -2972,7 +2936,7 @@
         </p:nvSpPr>
         <p:spPr>
           <a:xfrm>
-            <a:off x="4038600" y="6356350"/>
+            <a:off x="4038600" y="6356352"/>
             <a:ext cx="4114800" cy="365125"/>
           </a:xfrm>
           <a:prstGeom prst="rect">
@@ -2999,13 +2963,7 @@
       </p:sp>
       <p:sp>
         <p:nvSpPr>
-          <p:cNvPr id="6" name="灯片编号占位符 5">
-            <a:extLst>
-              <a:ext uri="{FF2B5EF4-FFF2-40B4-BE49-F238E27FC236}">
-                <a16:creationId xmlns:a16="http://schemas.microsoft.com/office/drawing/2014/main" id="{D2CCD274-59AD-4E8A-88FC-383BCB5F086C}"/>
-              </a:ext>
-            </a:extLst>
-          </p:cNvPr>
+          <p:cNvPr id="6" name="Slide Number Placeholder 5"/>
           <p:cNvSpPr>
             <a:spLocks noGrp="1"/>
           </p:cNvSpPr>
@@ -3015,7 +2973,7 @@
         </p:nvSpPr>
         <p:spPr>
           <a:xfrm>
-            <a:off x="8610600" y="6356350"/>
+            <a:off x="8610600" y="6356352"/>
             <a:ext cx="2743200" cy="365125"/>
           </a:xfrm>
           <a:prstGeom prst="rect">
@@ -3047,23 +3005,24 @@
     </p:spTree>
     <p:extLst>
       <p:ext uri="{BB962C8B-B14F-4D97-AF65-F5344CB8AC3E}">
-        <p14:creationId xmlns:p14="http://schemas.microsoft.com/office/powerpoint/2010/main" val="3753247855"/>
+        <p14:creationId xmlns:p14="http://schemas.microsoft.com/office/powerpoint/2010/main" val="4168608661"/>
       </p:ext>
     </p:extLst>
   </p:cSld>
   <p:clrMap bg1="lt1" tx1="dk1" bg2="lt2" tx2="dk2" accent1="accent1" accent2="accent2" accent3="accent3" accent4="accent4" accent5="accent5" accent6="accent6" hlink="hlink" folHlink="folHlink"/>
   <p:sldLayoutIdLst>
-    <p:sldLayoutId id="2147483649" r:id="rId1"/>
-    <p:sldLayoutId id="2147483650" r:id="rId2"/>
-    <p:sldLayoutId id="2147483651" r:id="rId3"/>
-    <p:sldLayoutId id="2147483652" r:id="rId4"/>
-    <p:sldLayoutId id="2147483653" r:id="rId5"/>
-    <p:sldLayoutId id="2147483654" r:id="rId6"/>
-    <p:sldLayoutId id="2147483655" r:id="rId7"/>
-    <p:sldLayoutId id="2147483656" r:id="rId8"/>
-    <p:sldLayoutId id="2147483657" r:id="rId9"/>
-    <p:sldLayoutId id="2147483658" r:id="rId10"/>
-    <p:sldLayoutId id="2147483659" r:id="rId11"/>
+    <p:sldLayoutId id="2147483711" r:id="rId1"/>
+    <p:sldLayoutId id="2147483712" r:id="rId2"/>
+    <p:sldLayoutId id="2147483713" r:id="rId3"/>
+    <p:sldLayoutId id="2147483714" r:id="rId4"/>
+    <p:sldLayoutId id="2147483715" r:id="rId5"/>
+    <p:sldLayoutId id="2147483716" r:id="rId6"/>
+    <p:sldLayoutId id="2147483717" r:id="rId7"/>
+    <p:sldLayoutId id="2147483718" r:id="rId8"/>
+    <p:sldLayoutId id="2147483719" r:id="rId9"/>
+    <p:sldLayoutId id="2147483720" r:id="rId10"/>
+    <p:sldLayoutId id="2147483721" r:id="rId11"/>
+    <p:sldLayoutId id="2147483722" r:id="rId12"/>
   </p:sldLayoutIdLst>
   <p:txStyles>
     <p:titleStyle>
@@ -3079,9 +3038,9 @@
           <a:solidFill>
             <a:schemeClr val="tx1"/>
           </a:solidFill>
-          <a:latin typeface="+mj-lt"/>
+          <a:latin typeface="Arial" panose="020B0604020202020204" pitchFamily="34" charset="0"/>
           <a:ea typeface="+mj-ea"/>
-          <a:cs typeface="+mj-cs"/>
+          <a:cs typeface="Arial" panose="020B0604020202020204" pitchFamily="34" charset="0"/>
         </a:defRPr>
       </a:lvl1pPr>
     </p:titleStyle>
@@ -3099,9 +3058,9 @@
           <a:solidFill>
             <a:schemeClr val="tx1"/>
           </a:solidFill>
-          <a:latin typeface="+mn-lt"/>
+          <a:latin typeface="Arial" panose="020B0604020202020204" pitchFamily="34" charset="0"/>
           <a:ea typeface="+mn-ea"/>
-          <a:cs typeface="+mn-cs"/>
+          <a:cs typeface="Arial" panose="020B0604020202020204" pitchFamily="34" charset="0"/>
         </a:defRPr>
       </a:lvl1pPr>
       <a:lvl2pPr marL="685800" indent="-228600" algn="l" defTabSz="914400" rtl="0" eaLnBrk="1" latinLnBrk="0" hangingPunct="1">
@@ -3117,9 +3076,9 @@
           <a:solidFill>
             <a:schemeClr val="tx1"/>
           </a:solidFill>
-          <a:latin typeface="+mn-lt"/>
+          <a:latin typeface="Arial" panose="020B0604020202020204" pitchFamily="34" charset="0"/>
           <a:ea typeface="+mn-ea"/>
-          <a:cs typeface="+mn-cs"/>
+          <a:cs typeface="Arial" panose="020B0604020202020204" pitchFamily="34" charset="0"/>
         </a:defRPr>
       </a:lvl2pPr>
       <a:lvl3pPr marL="1143000" indent="-228600" algn="l" defTabSz="914400" rtl="0" eaLnBrk="1" latinLnBrk="0" hangingPunct="1">
@@ -3135,9 +3094,9 @@
           <a:solidFill>
             <a:schemeClr val="tx1"/>
           </a:solidFill>
-          <a:latin typeface="+mn-lt"/>
+          <a:latin typeface="Arial" panose="020B0604020202020204" pitchFamily="34" charset="0"/>
           <a:ea typeface="+mn-ea"/>
-          <a:cs typeface="+mn-cs"/>
+          <a:cs typeface="Arial" panose="020B0604020202020204" pitchFamily="34" charset="0"/>
         </a:defRPr>
       </a:lvl3pPr>
       <a:lvl4pPr marL="1600200" indent="-228600" algn="l" defTabSz="914400" rtl="0" eaLnBrk="1" latinLnBrk="0" hangingPunct="1">
@@ -3153,9 +3112,9 @@
           <a:solidFill>
             <a:schemeClr val="tx1"/>
           </a:solidFill>
-          <a:latin typeface="+mn-lt"/>
+          <a:latin typeface="Arial" panose="020B0604020202020204" pitchFamily="34" charset="0"/>
           <a:ea typeface="+mn-ea"/>
-          <a:cs typeface="+mn-cs"/>
+          <a:cs typeface="Arial" panose="020B0604020202020204" pitchFamily="34" charset="0"/>
         </a:defRPr>
       </a:lvl4pPr>
       <a:lvl5pPr marL="2057400" indent="-228600" algn="l" defTabSz="914400" rtl="0" eaLnBrk="1" latinLnBrk="0" hangingPunct="1">
@@ -3171,9 +3130,9 @@
           <a:solidFill>
             <a:schemeClr val="tx1"/>
           </a:solidFill>
-          <a:latin typeface="+mn-lt"/>
+          <a:latin typeface="Arial" panose="020B0604020202020204" pitchFamily="34" charset="0"/>
           <a:ea typeface="+mn-ea"/>
-          <a:cs typeface="+mn-cs"/>
+          <a:cs typeface="Arial" panose="020B0604020202020204" pitchFamily="34" charset="0"/>
         </a:defRPr>
       </a:lvl5pPr>
       <a:lvl6pPr marL="2514600" indent="-228600" algn="l" defTabSz="914400" rtl="0" eaLnBrk="1" latinLnBrk="0" hangingPunct="1">
@@ -3251,7 +3210,7 @@
     </p:bodyStyle>
     <p:otherStyle>
       <a:defPPr>
-        <a:defRPr lang="zh-CN"/>
+        <a:defRPr lang="en-US"/>
       </a:defPPr>
       <a:lvl1pPr marL="0" algn="l" defTabSz="914400" rtl="0" eaLnBrk="1" latinLnBrk="0" hangingPunct="1">
         <a:defRPr sz="1800" kern="1200">
@@ -3419,6 +3378,25 @@
           <a:bodyPr/>
           <a:lstStyle/>
           <a:p>
+            <a:endParaRPr lang="en-US" altLang="zh-CN" dirty="0"/>
+          </a:p>
+          <a:p>
+            <a:r>
+              <a:rPr lang="en-US" altLang="zh-CN" dirty="0" err="1"/>
+              <a:t>Chenxu</a:t>
+            </a:r>
+            <a:r>
+              <a:rPr lang="en-US" altLang="zh-CN" dirty="0"/>
+              <a:t> Wang and </a:t>
+            </a:r>
+            <a:r>
+              <a:rPr lang="en-US" altLang="zh-CN" dirty="0" err="1"/>
+              <a:t>Fengwei</a:t>
+            </a:r>
+            <a:r>
+              <a:rPr lang="en-US" altLang="zh-CN" dirty="0"/>
+              <a:t> Zhang</a:t>
+            </a:r>
             <a:endParaRPr lang="zh-CN" altLang="en-US" dirty="0"/>
           </a:p>
         </p:txBody>
@@ -4474,7 +4452,7 @@
         </p:spPr>
         <p:txBody>
           <a:bodyPr>
-            <a:normAutofit lnSpcReduction="10000"/>
+            <a:normAutofit fontScale="92500"/>
           </a:bodyPr>
           <a:lstStyle/>
           <a:p>
@@ -4687,8 +4665,8 @@
         </p:blipFill>
         <p:spPr>
           <a:xfrm>
-            <a:off x="448236" y="2050621"/>
-            <a:ext cx="11295528" cy="3938954"/>
+            <a:off x="2381250" y="2705894"/>
+            <a:ext cx="7429500" cy="2590800"/>
           </a:xfrm>
         </p:spPr>
       </p:pic>
@@ -9727,7 +9705,7 @@
         </p:spPr>
         <p:txBody>
           <a:bodyPr>
-            <a:normAutofit/>
+            <a:normAutofit lnSpcReduction="10000"/>
           </a:bodyPr>
           <a:lstStyle/>
           <a:p>
@@ -10215,9 +10193,9 @@
 </file>
 
 <file path=ppt/theme/theme1.xml><?xml version="1.0" encoding="utf-8"?>
-<a:theme xmlns:a="http://schemas.openxmlformats.org/drawingml/2006/main" name="Office 主题​​">
+<a:theme xmlns:a="http://schemas.openxmlformats.org/drawingml/2006/main" name="cs315 new">
   <a:themeElements>
-    <a:clrScheme name="Office">
+    <a:clrScheme name="Office Theme">
       <a:dk1>
         <a:sysClr val="windowText" lastClr="000000"/>
       </a:dk1>
@@ -10255,9 +10233,9 @@
         <a:srgbClr val="954F72"/>
       </a:folHlink>
     </a:clrScheme>
-    <a:fontScheme name="Office">
+    <a:fontScheme name="Office Theme">
       <a:majorFont>
-        <a:latin typeface="等线 Light" panose="020F0302020204030204"/>
+        <a:latin typeface="Calibri Light" panose="020F0302020204030204"/>
         <a:ea typeface=""/>
         <a:cs typeface=""/>
         <a:font script="Jpan" typeface="游ゴシック Light"/>
@@ -10290,26 +10268,9 @@
         <a:font script="Viet" typeface="Times New Roman"/>
         <a:font script="Uigh" typeface="Microsoft Uighur"/>
         <a:font script="Geor" typeface="Sylfaen"/>
-        <a:font script="Armn" typeface="Arial"/>
-        <a:font script="Bugi" typeface="Leelawadee UI"/>
-        <a:font script="Bopo" typeface="Microsoft JhengHei"/>
-        <a:font script="Java" typeface="Javanese Text"/>
-        <a:font script="Lisu" typeface="Segoe UI"/>
-        <a:font script="Mymr" typeface="Myanmar Text"/>
-        <a:font script="Nkoo" typeface="Ebrima"/>
-        <a:font script="Olck" typeface="Nirmala UI"/>
-        <a:font script="Osma" typeface="Ebrima"/>
-        <a:font script="Phag" typeface="Phagspa"/>
-        <a:font script="Syrn" typeface="Estrangelo Edessa"/>
-        <a:font script="Syrj" typeface="Estrangelo Edessa"/>
-        <a:font script="Syre" typeface="Estrangelo Edessa"/>
-        <a:font script="Sora" typeface="Nirmala UI"/>
-        <a:font script="Tale" typeface="Microsoft Tai Le"/>
-        <a:font script="Talu" typeface="Microsoft New Tai Lue"/>
-        <a:font script="Tfng" typeface="Ebrima"/>
       </a:majorFont>
       <a:minorFont>
-        <a:latin typeface="等线" panose="020F0502020204030204"/>
+        <a:latin typeface="Calibri" panose="020F0502020204030204"/>
         <a:ea typeface=""/>
         <a:cs typeface=""/>
         <a:font script="Jpan" typeface="游ゴシック"/>
@@ -10342,26 +10303,9 @@
         <a:font script="Viet" typeface="Arial"/>
         <a:font script="Uigh" typeface="Microsoft Uighur"/>
         <a:font script="Geor" typeface="Sylfaen"/>
-        <a:font script="Armn" typeface="Arial"/>
-        <a:font script="Bugi" typeface="Leelawadee UI"/>
-        <a:font script="Bopo" typeface="Microsoft JhengHei"/>
-        <a:font script="Java" typeface="Javanese Text"/>
-        <a:font script="Lisu" typeface="Segoe UI"/>
-        <a:font script="Mymr" typeface="Myanmar Text"/>
-        <a:font script="Nkoo" typeface="Ebrima"/>
-        <a:font script="Olck" typeface="Nirmala UI"/>
-        <a:font script="Osma" typeface="Ebrima"/>
-        <a:font script="Phag" typeface="Phagspa"/>
-        <a:font script="Syrn" typeface="Estrangelo Edessa"/>
-        <a:font script="Syrj" typeface="Estrangelo Edessa"/>
-        <a:font script="Syre" typeface="Estrangelo Edessa"/>
-        <a:font script="Sora" typeface="Nirmala UI"/>
-        <a:font script="Tale" typeface="Microsoft Tai Le"/>
-        <a:font script="Talu" typeface="Microsoft New Tai Lue"/>
-        <a:font script="Tfng" typeface="Ebrima"/>
       </a:minorFont>
     </a:fontScheme>
-    <a:fmtScheme name="Office">
+    <a:fmtScheme name="Office Theme">
       <a:fillStyleLst>
         <a:solidFill>
           <a:schemeClr val="phClr"/>
@@ -10503,7 +10447,7 @@
   <a:extraClrSchemeLst/>
   <a:extLst>
     <a:ext uri="{05A4C25C-085E-4340-85A3-A5531E510DB2}">
-      <thm15:themeFamily xmlns:thm15="http://schemas.microsoft.com/office/thememl/2012/main" name="Office Theme" id="{62F939B6-93AF-4DB8-9C6B-D6C7DFDC589F}" vid="{4A3C46E8-61CC-4603-A589-7422A47A8E4A}"/>
+      <thm15:themeFamily xmlns:thm15="http://schemas.microsoft.com/office/thememl/2012/main" name="cs315 new" id="{BC4DD81C-7090-7E4C-A52E-FBFF49EC4813}" vid="{28FF83C4-53AF-5C4A-BCE6-875CAA98E96F}"/>
     </a:ext>
   </a:extLst>
 </a:theme>

</xml_diff>